<commit_message>
added comments on ML lectures
</commit_message>
<xml_diff>
--- a/lecture07.ML/lecture07.pptx
+++ b/lecture07.ML/lecture07.pptx
@@ -5,76 +5,77 @@
     <p:sldMasterId id="2147483648" r:id="rId1"/>
   </p:sldMasterIdLst>
   <p:notesMasterIdLst>
-    <p:notesMasterId r:id="rId69"/>
+    <p:notesMasterId r:id="rId70"/>
   </p:notesMasterIdLst>
   <p:sldIdLst>
     <p:sldId id="256" r:id="rId2"/>
-    <p:sldId id="288" r:id="rId3"/>
-    <p:sldId id="289" r:id="rId4"/>
-    <p:sldId id="290" r:id="rId5"/>
-    <p:sldId id="291" r:id="rId6"/>
-    <p:sldId id="292" r:id="rId7"/>
-    <p:sldId id="293" r:id="rId8"/>
-    <p:sldId id="294" r:id="rId9"/>
-    <p:sldId id="295" r:id="rId10"/>
-    <p:sldId id="296" r:id="rId11"/>
-    <p:sldId id="297" r:id="rId12"/>
-    <p:sldId id="298" r:id="rId13"/>
-    <p:sldId id="300" r:id="rId14"/>
-    <p:sldId id="258" r:id="rId15"/>
-    <p:sldId id="308" r:id="rId16"/>
-    <p:sldId id="309" r:id="rId17"/>
-    <p:sldId id="310" r:id="rId18"/>
-    <p:sldId id="311" r:id="rId19"/>
-    <p:sldId id="312" r:id="rId20"/>
-    <p:sldId id="313" r:id="rId21"/>
-    <p:sldId id="314" r:id="rId22"/>
-    <p:sldId id="315" r:id="rId23"/>
-    <p:sldId id="316" r:id="rId24"/>
-    <p:sldId id="317" r:id="rId25"/>
-    <p:sldId id="339" r:id="rId26"/>
-    <p:sldId id="302" r:id="rId27"/>
-    <p:sldId id="303" r:id="rId28"/>
-    <p:sldId id="304" r:id="rId29"/>
-    <p:sldId id="301" r:id="rId30"/>
-    <p:sldId id="338" r:id="rId31"/>
-    <p:sldId id="261" r:id="rId32"/>
-    <p:sldId id="263" r:id="rId33"/>
-    <p:sldId id="264" r:id="rId34"/>
-    <p:sldId id="265" r:id="rId35"/>
-    <p:sldId id="266" r:id="rId36"/>
-    <p:sldId id="267" r:id="rId37"/>
-    <p:sldId id="268" r:id="rId38"/>
-    <p:sldId id="270" r:id="rId39"/>
-    <p:sldId id="271" r:id="rId40"/>
-    <p:sldId id="272" r:id="rId41"/>
-    <p:sldId id="273" r:id="rId42"/>
-    <p:sldId id="305" r:id="rId43"/>
-    <p:sldId id="260" r:id="rId44"/>
-    <p:sldId id="337" r:id="rId45"/>
-    <p:sldId id="321" r:id="rId46"/>
-    <p:sldId id="322" r:id="rId47"/>
-    <p:sldId id="323" r:id="rId48"/>
-    <p:sldId id="334" r:id="rId49"/>
-    <p:sldId id="335" r:id="rId50"/>
-    <p:sldId id="336" r:id="rId51"/>
-    <p:sldId id="324" r:id="rId52"/>
-    <p:sldId id="325" r:id="rId53"/>
-    <p:sldId id="326" r:id="rId54"/>
-    <p:sldId id="327" r:id="rId55"/>
-    <p:sldId id="328" r:id="rId56"/>
-    <p:sldId id="329" r:id="rId57"/>
-    <p:sldId id="330" r:id="rId58"/>
-    <p:sldId id="331" r:id="rId59"/>
-    <p:sldId id="332" r:id="rId60"/>
-    <p:sldId id="333" r:id="rId61"/>
-    <p:sldId id="306" r:id="rId62"/>
-    <p:sldId id="307" r:id="rId63"/>
-    <p:sldId id="285" r:id="rId64"/>
-    <p:sldId id="276" r:id="rId65"/>
-    <p:sldId id="277" r:id="rId66"/>
-    <p:sldId id="278" r:id="rId67"/>
-    <p:sldId id="279" r:id="rId68"/>
+    <p:sldId id="340" r:id="rId3"/>
+    <p:sldId id="288" r:id="rId4"/>
+    <p:sldId id="289" r:id="rId5"/>
+    <p:sldId id="290" r:id="rId6"/>
+    <p:sldId id="291" r:id="rId7"/>
+    <p:sldId id="292" r:id="rId8"/>
+    <p:sldId id="293" r:id="rId9"/>
+    <p:sldId id="294" r:id="rId10"/>
+    <p:sldId id="295" r:id="rId11"/>
+    <p:sldId id="296" r:id="rId12"/>
+    <p:sldId id="297" r:id="rId13"/>
+    <p:sldId id="298" r:id="rId14"/>
+    <p:sldId id="300" r:id="rId15"/>
+    <p:sldId id="258" r:id="rId16"/>
+    <p:sldId id="308" r:id="rId17"/>
+    <p:sldId id="309" r:id="rId18"/>
+    <p:sldId id="310" r:id="rId19"/>
+    <p:sldId id="311" r:id="rId20"/>
+    <p:sldId id="312" r:id="rId21"/>
+    <p:sldId id="313" r:id="rId22"/>
+    <p:sldId id="314" r:id="rId23"/>
+    <p:sldId id="315" r:id="rId24"/>
+    <p:sldId id="316" r:id="rId25"/>
+    <p:sldId id="317" r:id="rId26"/>
+    <p:sldId id="339" r:id="rId27"/>
+    <p:sldId id="302" r:id="rId28"/>
+    <p:sldId id="303" r:id="rId29"/>
+    <p:sldId id="304" r:id="rId30"/>
+    <p:sldId id="301" r:id="rId31"/>
+    <p:sldId id="338" r:id="rId32"/>
+    <p:sldId id="261" r:id="rId33"/>
+    <p:sldId id="263" r:id="rId34"/>
+    <p:sldId id="264" r:id="rId35"/>
+    <p:sldId id="265" r:id="rId36"/>
+    <p:sldId id="266" r:id="rId37"/>
+    <p:sldId id="267" r:id="rId38"/>
+    <p:sldId id="268" r:id="rId39"/>
+    <p:sldId id="270" r:id="rId40"/>
+    <p:sldId id="271" r:id="rId41"/>
+    <p:sldId id="272" r:id="rId42"/>
+    <p:sldId id="273" r:id="rId43"/>
+    <p:sldId id="305" r:id="rId44"/>
+    <p:sldId id="260" r:id="rId45"/>
+    <p:sldId id="337" r:id="rId46"/>
+    <p:sldId id="321" r:id="rId47"/>
+    <p:sldId id="322" r:id="rId48"/>
+    <p:sldId id="323" r:id="rId49"/>
+    <p:sldId id="334" r:id="rId50"/>
+    <p:sldId id="335" r:id="rId51"/>
+    <p:sldId id="336" r:id="rId52"/>
+    <p:sldId id="324" r:id="rId53"/>
+    <p:sldId id="325" r:id="rId54"/>
+    <p:sldId id="326" r:id="rId55"/>
+    <p:sldId id="327" r:id="rId56"/>
+    <p:sldId id="328" r:id="rId57"/>
+    <p:sldId id="329" r:id="rId58"/>
+    <p:sldId id="330" r:id="rId59"/>
+    <p:sldId id="331" r:id="rId60"/>
+    <p:sldId id="332" r:id="rId61"/>
+    <p:sldId id="333" r:id="rId62"/>
+    <p:sldId id="306" r:id="rId63"/>
+    <p:sldId id="307" r:id="rId64"/>
+    <p:sldId id="285" r:id="rId65"/>
+    <p:sldId id="276" r:id="rId66"/>
+    <p:sldId id="277" r:id="rId67"/>
+    <p:sldId id="278" r:id="rId68"/>
+    <p:sldId id="279" r:id="rId69"/>
   </p:sldIdLst>
   <p:sldSz cx="12192000" cy="6858000"/>
   <p:notesSz cx="6858000" cy="9144000"/>
@@ -639,7 +640,7 @@
                 <a:latin typeface="Calibri"/>
               </a:rPr>
               <a:pPr/>
-              <a:t>15</a:t>
+              <a:t>16</a:t>
             </a:fld>
             <a:endParaRPr lang="en-US">
               <a:solidFill>
@@ -700,7 +701,7 @@
             <a:fld id="{4989FF08-9848-4C1E-B95F-2B3C79867F4F}" type="slidenum">
               <a:rPr lang="en-US"/>
               <a:pPr/>
-              <a:t>49</a:t>
+              <a:t>50</a:t>
             </a:fld>
             <a:endParaRPr lang="en-US"/>
           </a:p>
@@ -817,7 +818,7 @@
           <a:p>
             <a:fld id="{E18BB5A0-325C-4D56-ABE0-8BC54F40EFEF}" type="slidenum">
               <a:rPr lang="en-US" smtClean="0"/>
-              <a:t>52</a:t>
+              <a:t>53</a:t>
             </a:fld>
             <a:endParaRPr lang="en-US"/>
           </a:p>
@@ -873,7 +874,7 @@
             <a:fld id="{1BDE32BE-7060-409C-A0CB-7403F6FD9703}" type="slidenum">
               <a:rPr lang="tr-TR"/>
               <a:pPr/>
-              <a:t>67</a:t>
+              <a:t>68</a:t>
             </a:fld>
             <a:endParaRPr lang="tr-TR"/>
           </a:p>
@@ -4120,6 +4121,89 @@
           <a:p>
             <a:r>
               <a:rPr lang="en-US" dirty="0" smtClean="0"/>
+              <a:t>Strategy 3.2: filling in missing values</a:t>
+            </a:r>
+            <a:endParaRPr lang="en-US" dirty="0"/>
+          </a:p>
+        </p:txBody>
+      </p:sp>
+      <p:pic>
+        <p:nvPicPr>
+          <p:cNvPr id="3" name="Picture 2"/>
+          <p:cNvPicPr>
+            <a:picLocks noChangeAspect="1"/>
+          </p:cNvPicPr>
+          <p:nvPr/>
+        </p:nvPicPr>
+        <p:blipFill>
+          <a:blip r:embed="rId2">
+            <a:extLst>
+              <a:ext uri="{28A0092B-C50C-407E-A947-70E740481C1C}">
+                <a14:useLocalDpi xmlns:a14="http://schemas.microsoft.com/office/drawing/2010/main" val="0"/>
+              </a:ext>
+            </a:extLst>
+          </a:blip>
+          <a:stretch>
+            <a:fillRect/>
+          </a:stretch>
+        </p:blipFill>
+        <p:spPr>
+          <a:xfrm>
+            <a:off x="1981200" y="2000455"/>
+            <a:ext cx="8229600" cy="3683000"/>
+          </a:xfrm>
+          <a:prstGeom prst="rect">
+            <a:avLst/>
+          </a:prstGeom>
+        </p:spPr>
+      </p:pic>
+    </p:spTree>
+    <p:extLst>
+      <p:ext uri="{BB962C8B-B14F-4D97-AF65-F5344CB8AC3E}">
+        <p14:creationId xmlns:p14="http://schemas.microsoft.com/office/powerpoint/2010/main" val="563127059"/>
+      </p:ext>
+    </p:extLst>
+  </p:cSld>
+  <p:clrMapOvr>
+    <a:masterClrMapping/>
+  </p:clrMapOvr>
+</p:sld>
+</file>
+
+<file path=ppt/slides/slide11.xml><?xml version="1.0" encoding="utf-8"?>
+<p:sld xmlns:a="http://schemas.openxmlformats.org/drawingml/2006/main" xmlns:r="http://schemas.openxmlformats.org/officeDocument/2006/relationships" xmlns:p="http://schemas.openxmlformats.org/presentationml/2006/main">
+  <p:cSld>
+    <p:spTree>
+      <p:nvGrpSpPr>
+        <p:cNvPr id="1" name=""/>
+        <p:cNvGrpSpPr/>
+        <p:nvPr/>
+      </p:nvGrpSpPr>
+      <p:grpSpPr>
+        <a:xfrm>
+          <a:off x="0" y="0"/>
+          <a:ext cx="0" cy="0"/>
+          <a:chOff x="0" y="0"/>
+          <a:chExt cx="0" cy="0"/>
+        </a:xfrm>
+      </p:grpSpPr>
+      <p:sp>
+        <p:nvSpPr>
+          <p:cNvPr id="2" name="Title 1"/>
+          <p:cNvSpPr>
+            <a:spLocks noGrp="1"/>
+          </p:cNvSpPr>
+          <p:nvPr>
+            <p:ph type="title"/>
+          </p:nvPr>
+        </p:nvSpPr>
+        <p:spPr/>
+        <p:txBody>
+          <a:bodyPr/>
+          <a:lstStyle/>
+          <a:p>
+            <a:r>
+              <a:rPr lang="en-US" dirty="0" smtClean="0"/>
               <a:t>Strategy 3.3 forward filling missing values</a:t>
             </a:r>
             <a:endParaRPr lang="en-US" dirty="0"/>
@@ -4169,7 +4253,7 @@
 </p:sld>
 </file>
 
-<file path=ppt/slides/slide11.xml><?xml version="1.0" encoding="utf-8"?>
+<file path=ppt/slides/slide12.xml><?xml version="1.0" encoding="utf-8"?>
 <p:sld xmlns:a="http://schemas.openxmlformats.org/drawingml/2006/main" xmlns:r="http://schemas.openxmlformats.org/officeDocument/2006/relationships" xmlns:p="http://schemas.openxmlformats.org/presentationml/2006/main">
   <p:cSld>
     <p:spTree>
@@ -4252,7 +4336,7 @@
 </p:sld>
 </file>
 
-<file path=ppt/slides/slide12.xml><?xml version="1.0" encoding="utf-8"?>
+<file path=ppt/slides/slide13.xml><?xml version="1.0" encoding="utf-8"?>
 <p:sld xmlns:a="http://schemas.openxmlformats.org/drawingml/2006/main" xmlns:r="http://schemas.openxmlformats.org/officeDocument/2006/relationships" xmlns:p="http://schemas.openxmlformats.org/presentationml/2006/main">
   <p:cSld>
     <p:spTree>
@@ -4342,7 +4426,7 @@
 </p:sld>
 </file>
 
-<file path=ppt/slides/slide13.xml><?xml version="1.0" encoding="utf-8"?>
+<file path=ppt/slides/slide14.xml><?xml version="1.0" encoding="utf-8"?>
 <p:sld xmlns:a="http://schemas.openxmlformats.org/drawingml/2006/main" xmlns:r="http://schemas.openxmlformats.org/officeDocument/2006/relationships" xmlns:p="http://schemas.openxmlformats.org/presentationml/2006/main">
   <p:cSld>
     <p:spTree>
@@ -4454,7 +4538,7 @@
 </p:sld>
 </file>
 
-<file path=ppt/slides/slide14.xml><?xml version="1.0" encoding="utf-8"?>
+<file path=ppt/slides/slide15.xml><?xml version="1.0" encoding="utf-8"?>
 <p:sld xmlns:a="http://schemas.openxmlformats.org/drawingml/2006/main" xmlns:r="http://schemas.openxmlformats.org/officeDocument/2006/relationships" xmlns:p="http://schemas.openxmlformats.org/presentationml/2006/main">
   <p:cSld>
     <p:spTree>
@@ -4549,7 +4633,7 @@
 </p:sld>
 </file>
 
-<file path=ppt/slides/slide15.xml><?xml version="1.0" encoding="utf-8"?>
+<file path=ppt/slides/slide16.xml><?xml version="1.0" encoding="utf-8"?>
 <p:sld xmlns:a="http://schemas.openxmlformats.org/drawingml/2006/main" xmlns:r="http://schemas.openxmlformats.org/officeDocument/2006/relationships" xmlns:p="http://schemas.openxmlformats.org/presentationml/2006/main">
   <p:cSld>
     <p:spTree>
@@ -14930,7 +15014,7 @@
 </p:sld>
 </file>
 
-<file path=ppt/slides/slide16.xml><?xml version="1.0" encoding="utf-8"?>
+<file path=ppt/slides/slide17.xml><?xml version="1.0" encoding="utf-8"?>
 <p:sld xmlns:a="http://schemas.openxmlformats.org/drawingml/2006/main" xmlns:r="http://schemas.openxmlformats.org/officeDocument/2006/relationships" xmlns:p="http://schemas.openxmlformats.org/presentationml/2006/main">
   <p:cSld>
     <p:spTree>
@@ -15272,7 +15356,7 @@
 </p:sld>
 </file>
 
-<file path=ppt/slides/slide17.xml><?xml version="1.0" encoding="utf-8"?>
+<file path=ppt/slides/slide18.xml><?xml version="1.0" encoding="utf-8"?>
 <p:sld xmlns:a="http://schemas.openxmlformats.org/drawingml/2006/main" xmlns:r="http://schemas.openxmlformats.org/officeDocument/2006/relationships" xmlns:p="http://schemas.openxmlformats.org/presentationml/2006/main">
   <p:cSld>
     <p:spTree>
@@ -15614,7 +15698,7 @@
 </p:sld>
 </file>
 
-<file path=ppt/slides/slide18.xml><?xml version="1.0" encoding="utf-8"?>
+<file path=ppt/slides/slide19.xml><?xml version="1.0" encoding="utf-8"?>
 <p:sld xmlns:a="http://schemas.openxmlformats.org/drawingml/2006/main" xmlns:r="http://schemas.openxmlformats.org/officeDocument/2006/relationships" xmlns:p="http://schemas.openxmlformats.org/presentationml/2006/main">
   <p:cSld>
     <p:spTree>
@@ -15904,7 +15988,108 @@
 </p:sld>
 </file>
 
-<file path=ppt/slides/slide19.xml><?xml version="1.0" encoding="utf-8"?>
+<file path=ppt/slides/slide2.xml><?xml version="1.0" encoding="utf-8"?>
+<p:sld xmlns:a="http://schemas.openxmlformats.org/drawingml/2006/main" xmlns:r="http://schemas.openxmlformats.org/officeDocument/2006/relationships" xmlns:p="http://schemas.openxmlformats.org/presentationml/2006/main">
+  <p:cSld>
+    <p:spTree>
+      <p:nvGrpSpPr>
+        <p:cNvPr id="1" name=""/>
+        <p:cNvGrpSpPr/>
+        <p:nvPr/>
+      </p:nvGrpSpPr>
+      <p:grpSpPr>
+        <a:xfrm>
+          <a:off x="0" y="0"/>
+          <a:ext cx="0" cy="0"/>
+          <a:chOff x="0" y="0"/>
+          <a:chExt cx="0" cy="0"/>
+        </a:xfrm>
+      </p:grpSpPr>
+      <p:sp>
+        <p:nvSpPr>
+          <p:cNvPr id="2" name="Title 1"/>
+          <p:cNvSpPr>
+            <a:spLocks noGrp="1"/>
+          </p:cNvSpPr>
+          <p:nvPr>
+            <p:ph type="title"/>
+          </p:nvPr>
+        </p:nvSpPr>
+        <p:spPr/>
+        <p:txBody>
+          <a:bodyPr/>
+          <a:lstStyle/>
+          <a:p>
+            <a:r>
+              <a:rPr lang="en-US" dirty="0" smtClean="0"/>
+              <a:t>Prelude</a:t>
+            </a:r>
+            <a:endParaRPr lang="en-US" dirty="0"/>
+          </a:p>
+        </p:txBody>
+      </p:sp>
+      <p:sp>
+        <p:nvSpPr>
+          <p:cNvPr id="3" name="Content Placeholder 2"/>
+          <p:cNvSpPr>
+            <a:spLocks noGrp="1"/>
+          </p:cNvSpPr>
+          <p:nvPr>
+            <p:ph idx="1"/>
+          </p:nvPr>
+        </p:nvSpPr>
+        <p:spPr/>
+        <p:txBody>
+          <a:bodyPr/>
+          <a:lstStyle/>
+          <a:p>
+            <a:r>
+              <a:rPr lang="en-US" dirty="0" smtClean="0"/>
+              <a:t>Due to popular demand, we are redirecting the last 2 lectures of this course from Big Data Analytics &amp; Spark to Machine Learning.</a:t>
+            </a:r>
+          </a:p>
+          <a:p>
+            <a:r>
+              <a:rPr lang="en-US" dirty="0" smtClean="0"/>
+              <a:t>Your final project is due on Dec 3</a:t>
+            </a:r>
+            <a:r>
+              <a:rPr lang="en-US" baseline="30000" dirty="0" smtClean="0"/>
+              <a:t>rd</a:t>
+            </a:r>
+            <a:r>
+              <a:rPr lang="en-US" dirty="0" smtClean="0"/>
+              <a:t>, with optional presentation in class to show off what you have done for your project to the whole class.  This is your chance to learn the real-skill of communicating insights to others</a:t>
+            </a:r>
+            <a:r>
+              <a:rPr lang="en-US" smtClean="0"/>
+              <a:t>.  </a:t>
+            </a:r>
+            <a:endParaRPr lang="en-US" dirty="0" smtClean="0"/>
+          </a:p>
+        </p:txBody>
+      </p:sp>
+    </p:spTree>
+    <p:extLst>
+      <p:ext uri="{BB962C8B-B14F-4D97-AF65-F5344CB8AC3E}">
+        <p14:creationId xmlns:p14="http://schemas.microsoft.com/office/powerpoint/2010/main" val="487085241"/>
+      </p:ext>
+    </p:extLst>
+  </p:cSld>
+  <p:clrMapOvr>
+    <a:masterClrMapping/>
+  </p:clrMapOvr>
+  <p:timing>
+    <p:tnLst>
+      <p:par>
+        <p:cTn id="1" dur="indefinite" restart="never" nodeType="tmRoot"/>
+      </p:par>
+    </p:tnLst>
+  </p:timing>
+</p:sld>
+</file>
+
+<file path=ppt/slides/slide20.xml><?xml version="1.0" encoding="utf-8"?>
 <p:sld xmlns:a="http://schemas.openxmlformats.org/drawingml/2006/main" xmlns:r="http://schemas.openxmlformats.org/officeDocument/2006/relationships" xmlns:p="http://schemas.openxmlformats.org/presentationml/2006/main">
   <p:cSld>
     <p:spTree>
@@ -16334,119 +16519,7 @@
 </p:sld>
 </file>
 
-<file path=ppt/slides/slide2.xml><?xml version="1.0" encoding="utf-8"?>
-<p:sld xmlns:a="http://schemas.openxmlformats.org/drawingml/2006/main" xmlns:r="http://schemas.openxmlformats.org/officeDocument/2006/relationships" xmlns:p="http://schemas.openxmlformats.org/presentationml/2006/main">
-  <p:cSld>
-    <p:spTree>
-      <p:nvGrpSpPr>
-        <p:cNvPr id="1" name=""/>
-        <p:cNvGrpSpPr/>
-        <p:nvPr/>
-      </p:nvGrpSpPr>
-      <p:grpSpPr>
-        <a:xfrm>
-          <a:off x="0" y="0"/>
-          <a:ext cx="0" cy="0"/>
-          <a:chOff x="0" y="0"/>
-          <a:chExt cx="0" cy="0"/>
-        </a:xfrm>
-      </p:grpSpPr>
-      <p:sp>
-        <p:nvSpPr>
-          <p:cNvPr id="2" name="Title 1"/>
-          <p:cNvSpPr>
-            <a:spLocks noGrp="1"/>
-          </p:cNvSpPr>
-          <p:nvPr>
-            <p:ph type="title"/>
-          </p:nvPr>
-        </p:nvSpPr>
-        <p:spPr/>
-        <p:txBody>
-          <a:bodyPr/>
-          <a:lstStyle/>
-          <a:p>
-            <a:r>
-              <a:rPr lang="en-US" b="1" dirty="0" smtClean="0"/>
-              <a:t>Agenda</a:t>
-            </a:r>
-            <a:endParaRPr lang="en-US" b="1" dirty="0"/>
-          </a:p>
-        </p:txBody>
-      </p:sp>
-      <p:sp>
-        <p:nvSpPr>
-          <p:cNvPr id="3" name="Content Placeholder 2"/>
-          <p:cNvSpPr>
-            <a:spLocks noGrp="1"/>
-          </p:cNvSpPr>
-          <p:nvPr>
-            <p:ph idx="1"/>
-          </p:nvPr>
-        </p:nvSpPr>
-        <p:spPr/>
-        <p:txBody>
-          <a:bodyPr/>
-          <a:lstStyle/>
-          <a:p>
-            <a:r>
-              <a:rPr lang="en-US" b="1" dirty="0" smtClean="0"/>
-              <a:t>Missing Values</a:t>
-            </a:r>
-          </a:p>
-          <a:p>
-            <a:r>
-              <a:rPr lang="en-US" dirty="0" smtClean="0"/>
-              <a:t>Introduction to Machine Learning</a:t>
-            </a:r>
-          </a:p>
-          <a:p>
-            <a:r>
-              <a:rPr lang="en-US" dirty="0" err="1" smtClean="0"/>
-              <a:t>Scikit</a:t>
-            </a:r>
-            <a:r>
-              <a:rPr lang="en-US" dirty="0" smtClean="0"/>
-              <a:t>-Learn</a:t>
-            </a:r>
-            <a:endParaRPr lang="en-US" dirty="0"/>
-          </a:p>
-          <a:p>
-            <a:r>
-              <a:rPr lang="en-US" dirty="0" smtClean="0"/>
-              <a:t>Regression</a:t>
-            </a:r>
-          </a:p>
-          <a:p>
-            <a:r>
-              <a:rPr lang="en-US" dirty="0" smtClean="0"/>
-              <a:t>Classification</a:t>
-            </a:r>
-            <a:endParaRPr lang="en-US" dirty="0"/>
-          </a:p>
-        </p:txBody>
-      </p:sp>
-    </p:spTree>
-    <p:extLst>
-      <p:ext uri="{BB962C8B-B14F-4D97-AF65-F5344CB8AC3E}">
-        <p14:creationId xmlns:p14="http://schemas.microsoft.com/office/powerpoint/2010/main" val="1760623041"/>
-      </p:ext>
-    </p:extLst>
-  </p:cSld>
-  <p:clrMapOvr>
-    <a:masterClrMapping/>
-  </p:clrMapOvr>
-  <p:timing>
-    <p:tnLst>
-      <p:par>
-        <p:cTn id="1" dur="indefinite" restart="never" nodeType="tmRoot"/>
-      </p:par>
-    </p:tnLst>
-  </p:timing>
-</p:sld>
-</file>
-
-<file path=ppt/slides/slide20.xml><?xml version="1.0" encoding="utf-8"?>
+<file path=ppt/slides/slide21.xml><?xml version="1.0" encoding="utf-8"?>
 <p:sld xmlns:a="http://schemas.openxmlformats.org/drawingml/2006/main" xmlns:r="http://schemas.openxmlformats.org/officeDocument/2006/relationships" xmlns:p="http://schemas.openxmlformats.org/presentationml/2006/main">
   <p:cSld>
     <p:spTree>
@@ -16870,7 +16943,7 @@
 </p:sld>
 </file>
 
-<file path=ppt/slides/slide21.xml><?xml version="1.0" encoding="utf-8"?>
+<file path=ppt/slides/slide22.xml><?xml version="1.0" encoding="utf-8"?>
 <p:sld xmlns:a="http://schemas.openxmlformats.org/drawingml/2006/main" xmlns:r="http://schemas.openxmlformats.org/officeDocument/2006/relationships" xmlns:p="http://schemas.openxmlformats.org/presentationml/2006/main">
   <p:cSld>
     <p:spTree>
@@ -17471,7 +17544,7 @@
 </p:sld>
 </file>
 
-<file path=ppt/slides/slide22.xml><?xml version="1.0" encoding="utf-8"?>
+<file path=ppt/slides/slide23.xml><?xml version="1.0" encoding="utf-8"?>
 <p:sld xmlns:a="http://schemas.openxmlformats.org/drawingml/2006/main" xmlns:r="http://schemas.openxmlformats.org/officeDocument/2006/relationships" xmlns:p="http://schemas.openxmlformats.org/presentationml/2006/main">
   <p:cSld>
     <p:spTree>
@@ -18043,7 +18116,7 @@
 </p:sld>
 </file>
 
-<file path=ppt/slides/slide23.xml><?xml version="1.0" encoding="utf-8"?>
+<file path=ppt/slides/slide24.xml><?xml version="1.0" encoding="utf-8"?>
 <p:sld xmlns:a="http://schemas.openxmlformats.org/drawingml/2006/main" xmlns:r="http://schemas.openxmlformats.org/officeDocument/2006/relationships" xmlns:p="http://schemas.openxmlformats.org/presentationml/2006/main">
   <p:cSld>
     <p:spTree>
@@ -23708,7 +23781,7 @@
 </p:sld>
 </file>
 
-<file path=ppt/slides/slide24.xml><?xml version="1.0" encoding="utf-8"?>
+<file path=ppt/slides/slide25.xml><?xml version="1.0" encoding="utf-8"?>
 <p:sld xmlns:a="http://schemas.openxmlformats.org/drawingml/2006/main" xmlns:r="http://schemas.openxmlformats.org/officeDocument/2006/relationships" xmlns:p="http://schemas.openxmlformats.org/presentationml/2006/main">
   <p:cSld>
     <p:spTree>
@@ -23886,7 +23959,7 @@
 </p:sld>
 </file>
 
-<file path=ppt/slides/slide25.xml><?xml version="1.0" encoding="utf-8"?>
+<file path=ppt/slides/slide26.xml><?xml version="1.0" encoding="utf-8"?>
 <p:sld xmlns:a="http://schemas.openxmlformats.org/drawingml/2006/main" xmlns:r="http://schemas.openxmlformats.org/officeDocument/2006/relationships" xmlns:p="http://schemas.openxmlformats.org/presentationml/2006/main">
   <p:cSld>
     <p:spTree>
@@ -23998,7 +24071,7 @@
 </p:sld>
 </file>
 
-<file path=ppt/slides/slide26.xml><?xml version="1.0" encoding="utf-8"?>
+<file path=ppt/slides/slide27.xml><?xml version="1.0" encoding="utf-8"?>
 <p:sld xmlns:a="http://schemas.openxmlformats.org/drawingml/2006/main" xmlns:r="http://schemas.openxmlformats.org/officeDocument/2006/relationships" xmlns:p="http://schemas.openxmlformats.org/presentationml/2006/main">
   <p:cSld>
     <p:spTree>
@@ -24179,7 +24252,7 @@
 </p:sld>
 </file>
 
-<file path=ppt/slides/slide27.xml><?xml version="1.0" encoding="utf-8"?>
+<file path=ppt/slides/slide28.xml><?xml version="1.0" encoding="utf-8"?>
 <p:sld xmlns:a="http://schemas.openxmlformats.org/drawingml/2006/main" xmlns:r="http://schemas.openxmlformats.org/officeDocument/2006/relationships" xmlns:p="http://schemas.openxmlformats.org/presentationml/2006/main">
   <p:cSld>
     <p:spTree>
@@ -24281,7 +24354,7 @@
 </p:sld>
 </file>
 
-<file path=ppt/slides/slide28.xml><?xml version="1.0" encoding="utf-8"?>
+<file path=ppt/slides/slide29.xml><?xml version="1.0" encoding="utf-8"?>
 <p:sld xmlns:a="http://schemas.openxmlformats.org/drawingml/2006/main" xmlns:r="http://schemas.openxmlformats.org/officeDocument/2006/relationships" xmlns:p="http://schemas.openxmlformats.org/presentationml/2006/main">
   <p:cSld>
     <p:spTree>
@@ -24416,7 +24489,119 @@
 </p:sld>
 </file>
 
-<file path=ppt/slides/slide29.xml><?xml version="1.0" encoding="utf-8"?>
+<file path=ppt/slides/slide3.xml><?xml version="1.0" encoding="utf-8"?>
+<p:sld xmlns:a="http://schemas.openxmlformats.org/drawingml/2006/main" xmlns:r="http://schemas.openxmlformats.org/officeDocument/2006/relationships" xmlns:p="http://schemas.openxmlformats.org/presentationml/2006/main">
+  <p:cSld>
+    <p:spTree>
+      <p:nvGrpSpPr>
+        <p:cNvPr id="1" name=""/>
+        <p:cNvGrpSpPr/>
+        <p:nvPr/>
+      </p:nvGrpSpPr>
+      <p:grpSpPr>
+        <a:xfrm>
+          <a:off x="0" y="0"/>
+          <a:ext cx="0" cy="0"/>
+          <a:chOff x="0" y="0"/>
+          <a:chExt cx="0" cy="0"/>
+        </a:xfrm>
+      </p:grpSpPr>
+      <p:sp>
+        <p:nvSpPr>
+          <p:cNvPr id="2" name="Title 1"/>
+          <p:cNvSpPr>
+            <a:spLocks noGrp="1"/>
+          </p:cNvSpPr>
+          <p:nvPr>
+            <p:ph type="title"/>
+          </p:nvPr>
+        </p:nvSpPr>
+        <p:spPr/>
+        <p:txBody>
+          <a:bodyPr/>
+          <a:lstStyle/>
+          <a:p>
+            <a:r>
+              <a:rPr lang="en-US" b="1" dirty="0" smtClean="0"/>
+              <a:t>Agenda</a:t>
+            </a:r>
+            <a:endParaRPr lang="en-US" b="1" dirty="0"/>
+          </a:p>
+        </p:txBody>
+      </p:sp>
+      <p:sp>
+        <p:nvSpPr>
+          <p:cNvPr id="3" name="Content Placeholder 2"/>
+          <p:cNvSpPr>
+            <a:spLocks noGrp="1"/>
+          </p:cNvSpPr>
+          <p:nvPr>
+            <p:ph idx="1"/>
+          </p:nvPr>
+        </p:nvSpPr>
+        <p:spPr/>
+        <p:txBody>
+          <a:bodyPr/>
+          <a:lstStyle/>
+          <a:p>
+            <a:r>
+              <a:rPr lang="en-US" b="1" dirty="0" smtClean="0"/>
+              <a:t>Missing Values</a:t>
+            </a:r>
+          </a:p>
+          <a:p>
+            <a:r>
+              <a:rPr lang="en-US" dirty="0" smtClean="0"/>
+              <a:t>Introduction to Machine Learning</a:t>
+            </a:r>
+          </a:p>
+          <a:p>
+            <a:r>
+              <a:rPr lang="en-US" dirty="0" err="1" smtClean="0"/>
+              <a:t>Scikit</a:t>
+            </a:r>
+            <a:r>
+              <a:rPr lang="en-US" dirty="0" smtClean="0"/>
+              <a:t>-Learn</a:t>
+            </a:r>
+            <a:endParaRPr lang="en-US" dirty="0"/>
+          </a:p>
+          <a:p>
+            <a:r>
+              <a:rPr lang="en-US" dirty="0" smtClean="0"/>
+              <a:t>Regression</a:t>
+            </a:r>
+          </a:p>
+          <a:p>
+            <a:r>
+              <a:rPr lang="en-US" dirty="0" smtClean="0"/>
+              <a:t>Classification</a:t>
+            </a:r>
+            <a:endParaRPr lang="en-US" dirty="0"/>
+          </a:p>
+        </p:txBody>
+      </p:sp>
+    </p:spTree>
+    <p:extLst>
+      <p:ext uri="{BB962C8B-B14F-4D97-AF65-F5344CB8AC3E}">
+        <p14:creationId xmlns:p14="http://schemas.microsoft.com/office/powerpoint/2010/main" val="1760623041"/>
+      </p:ext>
+    </p:extLst>
+  </p:cSld>
+  <p:clrMapOvr>
+    <a:masterClrMapping/>
+  </p:clrMapOvr>
+  <p:timing>
+    <p:tnLst>
+      <p:par>
+        <p:cTn id="1" dur="indefinite" restart="never" nodeType="tmRoot"/>
+      </p:par>
+    </p:tnLst>
+  </p:timing>
+</p:sld>
+</file>
+
+<file path=ppt/slides/slide30.xml><?xml version="1.0" encoding="utf-8"?>
 <p:sld xmlns:a="http://schemas.openxmlformats.org/drawingml/2006/main" xmlns:r="http://schemas.openxmlformats.org/officeDocument/2006/relationships" xmlns:p="http://schemas.openxmlformats.org/presentationml/2006/main">
   <p:cSld>
     <p:spTree>
@@ -24532,124 +24717,7 @@
 </p:sld>
 </file>
 
-<file path=ppt/slides/slide3.xml><?xml version="1.0" encoding="utf-8"?>
-<p:sld xmlns:a="http://schemas.openxmlformats.org/drawingml/2006/main" xmlns:r="http://schemas.openxmlformats.org/officeDocument/2006/relationships" xmlns:p="http://schemas.openxmlformats.org/presentationml/2006/main">
-  <p:cSld>
-    <p:spTree>
-      <p:nvGrpSpPr>
-        <p:cNvPr id="1" name=""/>
-        <p:cNvGrpSpPr/>
-        <p:nvPr/>
-      </p:nvGrpSpPr>
-      <p:grpSpPr>
-        <a:xfrm>
-          <a:off x="0" y="0"/>
-          <a:ext cx="0" cy="0"/>
-          <a:chOff x="0" y="0"/>
-          <a:chExt cx="0" cy="0"/>
-        </a:xfrm>
-      </p:grpSpPr>
-      <p:sp>
-        <p:nvSpPr>
-          <p:cNvPr id="2" name="Title 1"/>
-          <p:cNvSpPr>
-            <a:spLocks noGrp="1"/>
-          </p:cNvSpPr>
-          <p:nvPr>
-            <p:ph type="title"/>
-          </p:nvPr>
-        </p:nvSpPr>
-        <p:spPr/>
-        <p:txBody>
-          <a:bodyPr/>
-          <a:lstStyle/>
-          <a:p>
-            <a:r>
-              <a:rPr lang="en-US" dirty="0" smtClean="0"/>
-              <a:t>Missing Values: </a:t>
-            </a:r>
-            <a:r>
-              <a:rPr lang="en-US" dirty="0" err="1" smtClean="0"/>
-              <a:t>NaN</a:t>
-            </a:r>
-            <a:endParaRPr lang="en-US" dirty="0"/>
-          </a:p>
-        </p:txBody>
-      </p:sp>
-      <p:pic>
-        <p:nvPicPr>
-          <p:cNvPr id="4" name="Picture 3"/>
-          <p:cNvPicPr>
-            <a:picLocks noChangeAspect="1"/>
-          </p:cNvPicPr>
-          <p:nvPr/>
-        </p:nvPicPr>
-        <p:blipFill>
-          <a:blip r:embed="rId2">
-            <a:extLst>
-              <a:ext uri="{28A0092B-C50C-407E-A947-70E740481C1C}">
-                <a14:useLocalDpi xmlns:a14="http://schemas.microsoft.com/office/drawing/2010/main" val="0"/>
-              </a:ext>
-            </a:extLst>
-          </a:blip>
-          <a:stretch>
-            <a:fillRect/>
-          </a:stretch>
-        </p:blipFill>
-        <p:spPr>
-          <a:xfrm>
-            <a:off x="1870586" y="1869767"/>
-            <a:ext cx="8216900" cy="1879600"/>
-          </a:xfrm>
-          <a:prstGeom prst="rect">
-            <a:avLst/>
-          </a:prstGeom>
-        </p:spPr>
-      </p:pic>
-      <p:pic>
-        <p:nvPicPr>
-          <p:cNvPr id="5" name="Picture 4"/>
-          <p:cNvPicPr>
-            <a:picLocks noChangeAspect="1"/>
-          </p:cNvPicPr>
-          <p:nvPr/>
-        </p:nvPicPr>
-        <p:blipFill>
-          <a:blip r:embed="rId3">
-            <a:extLst>
-              <a:ext uri="{28A0092B-C50C-407E-A947-70E740481C1C}">
-                <a14:useLocalDpi xmlns:a14="http://schemas.microsoft.com/office/drawing/2010/main" val="0"/>
-              </a:ext>
-            </a:extLst>
-          </a:blip>
-          <a:stretch>
-            <a:fillRect/>
-          </a:stretch>
-        </p:blipFill>
-        <p:spPr>
-          <a:xfrm>
-            <a:off x="1883286" y="4204520"/>
-            <a:ext cx="8204200" cy="1739900"/>
-          </a:xfrm>
-          <a:prstGeom prst="rect">
-            <a:avLst/>
-          </a:prstGeom>
-        </p:spPr>
-      </p:pic>
-    </p:spTree>
-    <p:extLst>
-      <p:ext uri="{BB962C8B-B14F-4D97-AF65-F5344CB8AC3E}">
-        <p14:creationId xmlns:p14="http://schemas.microsoft.com/office/powerpoint/2010/main" val="614278074"/>
-      </p:ext>
-    </p:extLst>
-  </p:cSld>
-  <p:clrMapOvr>
-    <a:masterClrMapping/>
-  </p:clrMapOvr>
-</p:sld>
-</file>
-
-<file path=ppt/slides/slide30.xml><?xml version="1.0" encoding="utf-8"?>
+<file path=ppt/slides/slide31.xml><?xml version="1.0" encoding="utf-8"?>
 <p:sld xmlns:a="http://schemas.openxmlformats.org/drawingml/2006/main" xmlns:r="http://schemas.openxmlformats.org/officeDocument/2006/relationships" xmlns:p="http://schemas.openxmlformats.org/presentationml/2006/main">
   <p:cSld>
     <p:spTree>
@@ -24931,7 +24999,7 @@
             <a:fld id="{B25A429E-EC32-4435-B6D9-2C358E91B0C4}" type="slidenum">
               <a:rPr lang="tr-TR" smtClean="0"/>
               <a:pPr/>
-              <a:t>30</a:t>
+              <a:t>31</a:t>
             </a:fld>
             <a:endParaRPr lang="tr-TR"/>
           </a:p>
@@ -24980,7 +25048,7 @@
 </p:sld>
 </file>
 
-<file path=ppt/slides/slide31.xml><?xml version="1.0" encoding="utf-8"?>
+<file path=ppt/slides/slide32.xml><?xml version="1.0" encoding="utf-8"?>
 <p:sld xmlns:a="http://schemas.openxmlformats.org/drawingml/2006/main" xmlns:r="http://schemas.openxmlformats.org/officeDocument/2006/relationships" xmlns:p="http://schemas.openxmlformats.org/presentationml/2006/main">
   <p:cSld>
     <p:spTree>
@@ -25103,7 +25171,7 @@
 </p:sld>
 </file>
 
-<file path=ppt/slides/slide32.xml><?xml version="1.0" encoding="utf-8"?>
+<file path=ppt/slides/slide33.xml><?xml version="1.0" encoding="utf-8"?>
 <p:sld xmlns:a="http://schemas.openxmlformats.org/drawingml/2006/main" xmlns:r="http://schemas.openxmlformats.org/officeDocument/2006/relationships" xmlns:p="http://schemas.openxmlformats.org/presentationml/2006/main">
   <p:cSld>
     <p:spTree>
@@ -25228,7 +25296,7 @@
 </p:sld>
 </file>
 
-<file path=ppt/slides/slide33.xml><?xml version="1.0" encoding="utf-8"?>
+<file path=ppt/slides/slide34.xml><?xml version="1.0" encoding="utf-8"?>
 <p:sld xmlns:a="http://schemas.openxmlformats.org/drawingml/2006/main" xmlns:r="http://schemas.openxmlformats.org/officeDocument/2006/relationships" xmlns:p="http://schemas.openxmlformats.org/presentationml/2006/main">
   <p:cSld>
     <p:spTree>
@@ -25790,7 +25858,7 @@
 </p:sld>
 </file>
 
-<file path=ppt/slides/slide34.xml><?xml version="1.0" encoding="utf-8"?>
+<file path=ppt/slides/slide35.xml><?xml version="1.0" encoding="utf-8"?>
 <p:sld xmlns:a="http://schemas.openxmlformats.org/drawingml/2006/main" xmlns:r="http://schemas.openxmlformats.org/officeDocument/2006/relationships" xmlns:p="http://schemas.openxmlformats.org/presentationml/2006/main">
   <p:cSld>
     <p:spTree>
@@ -25910,7 +25978,7 @@
 </p:sld>
 </file>
 
-<file path=ppt/slides/slide35.xml><?xml version="1.0" encoding="utf-8"?>
+<file path=ppt/slides/slide36.xml><?xml version="1.0" encoding="utf-8"?>
 <p:sld xmlns:a="http://schemas.openxmlformats.org/drawingml/2006/main" xmlns:r="http://schemas.openxmlformats.org/officeDocument/2006/relationships" xmlns:p="http://schemas.openxmlformats.org/presentationml/2006/main">
   <p:cSld>
     <p:spTree>
@@ -26030,7 +26098,7 @@
 </p:sld>
 </file>
 
-<file path=ppt/slides/slide36.xml><?xml version="1.0" encoding="utf-8"?>
+<file path=ppt/slides/slide37.xml><?xml version="1.0" encoding="utf-8"?>
 <p:sld xmlns:a="http://schemas.openxmlformats.org/drawingml/2006/main" xmlns:r="http://schemas.openxmlformats.org/officeDocument/2006/relationships" xmlns:p="http://schemas.openxmlformats.org/presentationml/2006/main">
   <p:cSld>
     <p:spTree>
@@ -26160,7 +26228,7 @@
 </p:sld>
 </file>
 
-<file path=ppt/slides/slide37.xml><?xml version="1.0" encoding="utf-8"?>
+<file path=ppt/slides/slide38.xml><?xml version="1.0" encoding="utf-8"?>
 <p:sld xmlns:a="http://schemas.openxmlformats.org/drawingml/2006/main" xmlns:r="http://schemas.openxmlformats.org/officeDocument/2006/relationships" xmlns:p="http://schemas.openxmlformats.org/presentationml/2006/main">
   <p:cSld>
     <p:spTree>
@@ -26280,7 +26348,7 @@
 </p:sld>
 </file>
 
-<file path=ppt/slides/slide38.xml><?xml version="1.0" encoding="utf-8"?>
+<file path=ppt/slides/slide39.xml><?xml version="1.0" encoding="utf-8"?>
 <p:sld xmlns:a="http://schemas.openxmlformats.org/drawingml/2006/main" xmlns:r="http://schemas.openxmlformats.org/officeDocument/2006/relationships" xmlns:p="http://schemas.openxmlformats.org/presentationml/2006/main">
   <p:cSld>
     <p:spTree>
@@ -26919,7 +26987,124 @@
 </p:sld>
 </file>
 
-<file path=ppt/slides/slide39.xml><?xml version="1.0" encoding="utf-8"?>
+<file path=ppt/slides/slide4.xml><?xml version="1.0" encoding="utf-8"?>
+<p:sld xmlns:a="http://schemas.openxmlformats.org/drawingml/2006/main" xmlns:r="http://schemas.openxmlformats.org/officeDocument/2006/relationships" xmlns:p="http://schemas.openxmlformats.org/presentationml/2006/main">
+  <p:cSld>
+    <p:spTree>
+      <p:nvGrpSpPr>
+        <p:cNvPr id="1" name=""/>
+        <p:cNvGrpSpPr/>
+        <p:nvPr/>
+      </p:nvGrpSpPr>
+      <p:grpSpPr>
+        <a:xfrm>
+          <a:off x="0" y="0"/>
+          <a:ext cx="0" cy="0"/>
+          <a:chOff x="0" y="0"/>
+          <a:chExt cx="0" cy="0"/>
+        </a:xfrm>
+      </p:grpSpPr>
+      <p:sp>
+        <p:nvSpPr>
+          <p:cNvPr id="2" name="Title 1"/>
+          <p:cNvSpPr>
+            <a:spLocks noGrp="1"/>
+          </p:cNvSpPr>
+          <p:nvPr>
+            <p:ph type="title"/>
+          </p:nvPr>
+        </p:nvSpPr>
+        <p:spPr/>
+        <p:txBody>
+          <a:bodyPr/>
+          <a:lstStyle/>
+          <a:p>
+            <a:r>
+              <a:rPr lang="en-US" dirty="0" smtClean="0"/>
+              <a:t>Missing Values: </a:t>
+            </a:r>
+            <a:r>
+              <a:rPr lang="en-US" dirty="0" err="1" smtClean="0"/>
+              <a:t>NaN</a:t>
+            </a:r>
+            <a:endParaRPr lang="en-US" dirty="0"/>
+          </a:p>
+        </p:txBody>
+      </p:sp>
+      <p:pic>
+        <p:nvPicPr>
+          <p:cNvPr id="4" name="Picture 3"/>
+          <p:cNvPicPr>
+            <a:picLocks noChangeAspect="1"/>
+          </p:cNvPicPr>
+          <p:nvPr/>
+        </p:nvPicPr>
+        <p:blipFill>
+          <a:blip r:embed="rId2">
+            <a:extLst>
+              <a:ext uri="{28A0092B-C50C-407E-A947-70E740481C1C}">
+                <a14:useLocalDpi xmlns:a14="http://schemas.microsoft.com/office/drawing/2010/main" val="0"/>
+              </a:ext>
+            </a:extLst>
+          </a:blip>
+          <a:stretch>
+            <a:fillRect/>
+          </a:stretch>
+        </p:blipFill>
+        <p:spPr>
+          <a:xfrm>
+            <a:off x="1870586" y="1869767"/>
+            <a:ext cx="8216900" cy="1879600"/>
+          </a:xfrm>
+          <a:prstGeom prst="rect">
+            <a:avLst/>
+          </a:prstGeom>
+        </p:spPr>
+      </p:pic>
+      <p:pic>
+        <p:nvPicPr>
+          <p:cNvPr id="5" name="Picture 4"/>
+          <p:cNvPicPr>
+            <a:picLocks noChangeAspect="1"/>
+          </p:cNvPicPr>
+          <p:nvPr/>
+        </p:nvPicPr>
+        <p:blipFill>
+          <a:blip r:embed="rId3">
+            <a:extLst>
+              <a:ext uri="{28A0092B-C50C-407E-A947-70E740481C1C}">
+                <a14:useLocalDpi xmlns:a14="http://schemas.microsoft.com/office/drawing/2010/main" val="0"/>
+              </a:ext>
+            </a:extLst>
+          </a:blip>
+          <a:stretch>
+            <a:fillRect/>
+          </a:stretch>
+        </p:blipFill>
+        <p:spPr>
+          <a:xfrm>
+            <a:off x="1883286" y="4204520"/>
+            <a:ext cx="8204200" cy="1739900"/>
+          </a:xfrm>
+          <a:prstGeom prst="rect">
+            <a:avLst/>
+          </a:prstGeom>
+        </p:spPr>
+      </p:pic>
+    </p:spTree>
+    <p:extLst>
+      <p:ext uri="{BB962C8B-B14F-4D97-AF65-F5344CB8AC3E}">
+        <p14:creationId xmlns:p14="http://schemas.microsoft.com/office/powerpoint/2010/main" val="614278074"/>
+      </p:ext>
+    </p:extLst>
+  </p:cSld>
+  <p:clrMapOvr>
+    <a:masterClrMapping/>
+  </p:clrMapOvr>
+</p:sld>
+</file>
+
+<file path=ppt/slides/slide40.xml><?xml version="1.0" encoding="utf-8"?>
 <p:sld xmlns:a="http://schemas.openxmlformats.org/drawingml/2006/main" xmlns:r="http://schemas.openxmlformats.org/officeDocument/2006/relationships" xmlns:p="http://schemas.openxmlformats.org/presentationml/2006/main">
   <p:cSld>
     <p:spTree>
@@ -27514,120 +27699,7 @@
 </p:sld>
 </file>
 
-<file path=ppt/slides/slide4.xml><?xml version="1.0" encoding="utf-8"?>
-<p:sld xmlns:a="http://schemas.openxmlformats.org/drawingml/2006/main" xmlns:r="http://schemas.openxmlformats.org/officeDocument/2006/relationships" xmlns:p="http://schemas.openxmlformats.org/presentationml/2006/main">
-  <p:cSld>
-    <p:spTree>
-      <p:nvGrpSpPr>
-        <p:cNvPr id="1" name=""/>
-        <p:cNvGrpSpPr/>
-        <p:nvPr/>
-      </p:nvGrpSpPr>
-      <p:grpSpPr>
-        <a:xfrm>
-          <a:off x="0" y="0"/>
-          <a:ext cx="0" cy="0"/>
-          <a:chOff x="0" y="0"/>
-          <a:chExt cx="0" cy="0"/>
-        </a:xfrm>
-      </p:grpSpPr>
-      <p:sp>
-        <p:nvSpPr>
-          <p:cNvPr id="2" name="Title 1"/>
-          <p:cNvSpPr>
-            <a:spLocks noGrp="1"/>
-          </p:cNvSpPr>
-          <p:nvPr>
-            <p:ph type="title"/>
-          </p:nvPr>
-        </p:nvSpPr>
-        <p:spPr/>
-        <p:txBody>
-          <a:bodyPr/>
-          <a:lstStyle/>
-          <a:p>
-            <a:r>
-              <a:rPr lang="en-US" dirty="0" smtClean="0"/>
-              <a:t>Strategy 1: filtering out missing values</a:t>
-            </a:r>
-            <a:endParaRPr lang="en-US" dirty="0"/>
-          </a:p>
-        </p:txBody>
-      </p:sp>
-      <p:pic>
-        <p:nvPicPr>
-          <p:cNvPr id="4" name="Picture 3"/>
-          <p:cNvPicPr>
-            <a:picLocks noChangeAspect="1"/>
-          </p:cNvPicPr>
-          <p:nvPr/>
-        </p:nvPicPr>
-        <p:blipFill>
-          <a:blip r:embed="rId2">
-            <a:extLst>
-              <a:ext uri="{28A0092B-C50C-407E-A947-70E740481C1C}">
-                <a14:useLocalDpi xmlns:a14="http://schemas.microsoft.com/office/drawing/2010/main" val="0"/>
-              </a:ext>
-            </a:extLst>
-          </a:blip>
-          <a:stretch>
-            <a:fillRect/>
-          </a:stretch>
-        </p:blipFill>
-        <p:spPr>
-          <a:xfrm>
-            <a:off x="1981200" y="2089944"/>
-            <a:ext cx="8216900" cy="1879600"/>
-          </a:xfrm>
-          <a:prstGeom prst="rect">
-            <a:avLst/>
-          </a:prstGeom>
-        </p:spPr>
-      </p:pic>
-      <p:pic>
-        <p:nvPicPr>
-          <p:cNvPr id="5" name="Picture 4"/>
-          <p:cNvPicPr>
-            <a:picLocks noChangeAspect="1"/>
-          </p:cNvPicPr>
-          <p:nvPr/>
-        </p:nvPicPr>
-        <p:blipFill>
-          <a:blip r:embed="rId3">
-            <a:extLst>
-              <a:ext uri="{28A0092B-C50C-407E-A947-70E740481C1C}">
-                <a14:useLocalDpi xmlns:a14="http://schemas.microsoft.com/office/drawing/2010/main" val="0"/>
-              </a:ext>
-            </a:extLst>
-          </a:blip>
-          <a:stretch>
-            <a:fillRect/>
-          </a:stretch>
-        </p:blipFill>
-        <p:spPr>
-          <a:xfrm>
-            <a:off x="1993900" y="4368800"/>
-            <a:ext cx="8204200" cy="1460500"/>
-          </a:xfrm>
-          <a:prstGeom prst="rect">
-            <a:avLst/>
-          </a:prstGeom>
-        </p:spPr>
-      </p:pic>
-    </p:spTree>
-    <p:extLst>
-      <p:ext uri="{BB962C8B-B14F-4D97-AF65-F5344CB8AC3E}">
-        <p14:creationId xmlns:p14="http://schemas.microsoft.com/office/powerpoint/2010/main" val="1217698589"/>
-      </p:ext>
-    </p:extLst>
-  </p:cSld>
-  <p:clrMapOvr>
-    <a:masterClrMapping/>
-  </p:clrMapOvr>
-</p:sld>
-</file>
-
-<file path=ppt/slides/slide40.xml><?xml version="1.0" encoding="utf-8"?>
+<file path=ppt/slides/slide41.xml><?xml version="1.0" encoding="utf-8"?>
 <p:sld xmlns:a="http://schemas.openxmlformats.org/drawingml/2006/main" xmlns:r="http://schemas.openxmlformats.org/officeDocument/2006/relationships" xmlns:p="http://schemas.openxmlformats.org/presentationml/2006/main">
   <p:cSld>
     <p:spTree>
@@ -28158,7 +28230,7 @@
 </p:sld>
 </file>
 
-<file path=ppt/slides/slide41.xml><?xml version="1.0" encoding="utf-8"?>
+<file path=ppt/slides/slide42.xml><?xml version="1.0" encoding="utf-8"?>
 <p:sld xmlns:a="http://schemas.openxmlformats.org/drawingml/2006/main" xmlns:r="http://schemas.openxmlformats.org/officeDocument/2006/relationships" xmlns:p="http://schemas.openxmlformats.org/presentationml/2006/main">
   <p:cSld>
     <p:spTree>
@@ -28516,7 +28588,7 @@
 </p:sld>
 </file>
 
-<file path=ppt/slides/slide42.xml><?xml version="1.0" encoding="utf-8"?>
+<file path=ppt/slides/slide43.xml><?xml version="1.0" encoding="utf-8"?>
 <p:sld xmlns:a="http://schemas.openxmlformats.org/drawingml/2006/main" xmlns:r="http://schemas.openxmlformats.org/officeDocument/2006/relationships" xmlns:p="http://schemas.openxmlformats.org/presentationml/2006/main">
   <p:cSld>
     <p:spTree>
@@ -28584,12 +28656,16 @@
           </a:p>
           <a:p>
             <a:r>
-              <a:rPr lang="en-US" smtClean="0"/>
+              <a:rPr lang="en-US" dirty="0" err="1" smtClean="0"/>
               <a:t>Sci</a:t>
             </a:r>
             <a:r>
-              <a:rPr lang="en-US" smtClean="0"/>
-              <a:t>kit-Learn</a:t>
+              <a:rPr lang="en-US" dirty="0" err="1" smtClean="0"/>
+              <a:t>kit</a:t>
+            </a:r>
+            <a:r>
+              <a:rPr lang="en-US" dirty="0" smtClean="0"/>
+              <a:t>-Learn</a:t>
             </a:r>
             <a:endParaRPr lang="en-US" dirty="0"/>
           </a:p>
@@ -28628,7 +28704,7 @@
 </p:sld>
 </file>
 
-<file path=ppt/slides/slide43.xml><?xml version="1.0" encoding="utf-8"?>
+<file path=ppt/slides/slide44.xml><?xml version="1.0" encoding="utf-8"?>
 <p:sld xmlns:a="http://schemas.openxmlformats.org/drawingml/2006/main" xmlns:r="http://schemas.openxmlformats.org/officeDocument/2006/relationships" xmlns:p="http://schemas.openxmlformats.org/presentationml/2006/main">
   <p:cSld>
     <p:spTree>
@@ -28746,7 +28822,7 @@
 </p:sld>
 </file>
 
-<file path=ppt/slides/slide44.xml><?xml version="1.0" encoding="utf-8"?>
+<file path=ppt/slides/slide45.xml><?xml version="1.0" encoding="utf-8"?>
 <p:sld xmlns:a="http://schemas.openxmlformats.org/drawingml/2006/main" xmlns:r="http://schemas.openxmlformats.org/officeDocument/2006/relationships" xmlns:p="http://schemas.openxmlformats.org/presentationml/2006/main">
   <p:cSld>
     <p:spTree>
@@ -28853,7 +28929,7 @@
             <a:fld id="{6DF4C409-C017-451C-B236-E185BBA6E0E4}" type="slidenum">
               <a:rPr lang="tr-TR" smtClean="0"/>
               <a:pPr/>
-              <a:t>44</a:t>
+              <a:t>45</a:t>
             </a:fld>
             <a:endParaRPr lang="tr-TR" dirty="0"/>
           </a:p>
@@ -28902,7 +28978,7 @@
 </p:sld>
 </file>
 
-<file path=ppt/slides/slide45.xml><?xml version="1.0" encoding="utf-8"?>
+<file path=ppt/slides/slide46.xml><?xml version="1.0" encoding="utf-8"?>
 <p:sld xmlns:a="http://schemas.openxmlformats.org/drawingml/2006/main" xmlns:r="http://schemas.openxmlformats.org/officeDocument/2006/relationships" xmlns:p="http://schemas.openxmlformats.org/presentationml/2006/main">
   <p:cSld>
     <p:spTree>
@@ -28961,7 +29037,7 @@
             <a:fld id="{B6F15528-21DE-4FAA-801E-634DDDAF4B2B}" type="slidenum">
               <a:rPr lang="en-US" smtClean="0"/>
               <a:pPr/>
-              <a:t>45</a:t>
+              <a:t>46</a:t>
             </a:fld>
             <a:endParaRPr lang="en-US" dirty="0"/>
           </a:p>
@@ -29095,7 +29171,7 @@
 </p:sld>
 </file>
 
-<file path=ppt/slides/slide46.xml><?xml version="1.0" encoding="utf-8"?>
+<file path=ppt/slides/slide47.xml><?xml version="1.0" encoding="utf-8"?>
 <p:sld xmlns:a="http://schemas.openxmlformats.org/drawingml/2006/main" xmlns:r="http://schemas.openxmlformats.org/officeDocument/2006/relationships" xmlns:p="http://schemas.openxmlformats.org/presentationml/2006/main">
   <p:cSld>
     <p:spTree>
@@ -29155,7 +29231,7 @@
             <a:fld id="{B6F15528-21DE-4FAA-801E-634DDDAF4B2B}" type="slidenum">
               <a:rPr lang="en-US" smtClean="0"/>
               <a:pPr/>
-              <a:t>46</a:t>
+              <a:t>47</a:t>
             </a:fld>
             <a:endParaRPr lang="en-US" dirty="0"/>
           </a:p>
@@ -29235,7 +29311,7 @@
 </p:sld>
 </file>
 
-<file path=ppt/slides/slide47.xml><?xml version="1.0" encoding="utf-8"?>
+<file path=ppt/slides/slide48.xml><?xml version="1.0" encoding="utf-8"?>
 <p:sld xmlns:a="http://schemas.openxmlformats.org/drawingml/2006/main" xmlns:r="http://schemas.openxmlformats.org/officeDocument/2006/relationships" xmlns:p="http://schemas.openxmlformats.org/presentationml/2006/main">
   <p:cSld>
     <p:spTree>
@@ -29653,7 +29729,7 @@
             <a:fld id="{B6F15528-21DE-4FAA-801E-634DDDAF4B2B}" type="slidenum">
               <a:rPr lang="en-US" smtClean="0"/>
               <a:pPr/>
-              <a:t>47</a:t>
+              <a:t>48</a:t>
             </a:fld>
             <a:endParaRPr lang="en-US" dirty="0"/>
           </a:p>
@@ -29679,7 +29755,7 @@
 </p:sld>
 </file>
 
-<file path=ppt/slides/slide48.xml><?xml version="1.0" encoding="utf-8"?>
+<file path=ppt/slides/slide49.xml><?xml version="1.0" encoding="utf-8"?>
 <p:sld xmlns:a="http://schemas.openxmlformats.org/drawingml/2006/main" xmlns:r="http://schemas.openxmlformats.org/officeDocument/2006/relationships" xmlns:p="http://schemas.openxmlformats.org/presentationml/2006/main">
   <p:cSld>
     <p:spTree>
@@ -32471,7 +32547,127 @@
 </p:sld>
 </file>
 
-<file path=ppt/slides/slide49.xml><?xml version="1.0" encoding="utf-8"?>
+<file path=ppt/slides/slide5.xml><?xml version="1.0" encoding="utf-8"?>
+<p:sld xmlns:a="http://schemas.openxmlformats.org/drawingml/2006/main" xmlns:r="http://schemas.openxmlformats.org/officeDocument/2006/relationships" xmlns:p="http://schemas.openxmlformats.org/presentationml/2006/main">
+  <p:cSld>
+    <p:spTree>
+      <p:nvGrpSpPr>
+        <p:cNvPr id="1" name=""/>
+        <p:cNvGrpSpPr/>
+        <p:nvPr/>
+      </p:nvGrpSpPr>
+      <p:grpSpPr>
+        <a:xfrm>
+          <a:off x="0" y="0"/>
+          <a:ext cx="0" cy="0"/>
+          <a:chOff x="0" y="0"/>
+          <a:chExt cx="0" cy="0"/>
+        </a:xfrm>
+      </p:grpSpPr>
+      <p:sp>
+        <p:nvSpPr>
+          <p:cNvPr id="2" name="Title 1"/>
+          <p:cNvSpPr>
+            <a:spLocks noGrp="1"/>
+          </p:cNvSpPr>
+          <p:nvPr>
+            <p:ph type="title"/>
+          </p:nvPr>
+        </p:nvSpPr>
+        <p:spPr/>
+        <p:txBody>
+          <a:bodyPr/>
+          <a:lstStyle/>
+          <a:p>
+            <a:r>
+              <a:rPr lang="en-US" dirty="0" smtClean="0"/>
+              <a:t>Strategy 1: filtering out missing values</a:t>
+            </a:r>
+            <a:endParaRPr lang="en-US" dirty="0"/>
+          </a:p>
+        </p:txBody>
+      </p:sp>
+      <p:pic>
+        <p:nvPicPr>
+          <p:cNvPr id="4" name="Picture 3"/>
+          <p:cNvPicPr>
+            <a:picLocks noChangeAspect="1"/>
+          </p:cNvPicPr>
+          <p:nvPr/>
+        </p:nvPicPr>
+        <p:blipFill>
+          <a:blip r:embed="rId2">
+            <a:extLst>
+              <a:ext uri="{28A0092B-C50C-407E-A947-70E740481C1C}">
+                <a14:useLocalDpi xmlns:a14="http://schemas.microsoft.com/office/drawing/2010/main" val="0"/>
+              </a:ext>
+            </a:extLst>
+          </a:blip>
+          <a:stretch>
+            <a:fillRect/>
+          </a:stretch>
+        </p:blipFill>
+        <p:spPr>
+          <a:xfrm>
+            <a:off x="1981200" y="2089944"/>
+            <a:ext cx="8216900" cy="1879600"/>
+          </a:xfrm>
+          <a:prstGeom prst="rect">
+            <a:avLst/>
+          </a:prstGeom>
+        </p:spPr>
+      </p:pic>
+      <p:pic>
+        <p:nvPicPr>
+          <p:cNvPr id="5" name="Picture 4"/>
+          <p:cNvPicPr>
+            <a:picLocks noChangeAspect="1"/>
+          </p:cNvPicPr>
+          <p:nvPr/>
+        </p:nvPicPr>
+        <p:blipFill>
+          <a:blip r:embed="rId3">
+            <a:extLst>
+              <a:ext uri="{28A0092B-C50C-407E-A947-70E740481C1C}">
+                <a14:useLocalDpi xmlns:a14="http://schemas.microsoft.com/office/drawing/2010/main" val="0"/>
+              </a:ext>
+            </a:extLst>
+          </a:blip>
+          <a:stretch>
+            <a:fillRect/>
+          </a:stretch>
+        </p:blipFill>
+        <p:spPr>
+          <a:xfrm>
+            <a:off x="1993900" y="4368800"/>
+            <a:ext cx="8204200" cy="1460500"/>
+          </a:xfrm>
+          <a:prstGeom prst="rect">
+            <a:avLst/>
+          </a:prstGeom>
+        </p:spPr>
+      </p:pic>
+    </p:spTree>
+    <p:extLst>
+      <p:ext uri="{BB962C8B-B14F-4D97-AF65-F5344CB8AC3E}">
+        <p14:creationId xmlns:p14="http://schemas.microsoft.com/office/powerpoint/2010/main" val="1217698589"/>
+      </p:ext>
+    </p:extLst>
+  </p:cSld>
+  <p:clrMapOvr>
+    <a:masterClrMapping/>
+  </p:clrMapOvr>
+  <p:timing>
+    <p:tnLst>
+      <p:par>
+        <p:cTn id="1" dur="indefinite" restart="never" nodeType="tmRoot"/>
+      </p:par>
+    </p:tnLst>
+  </p:timing>
+</p:sld>
+</file>
+
+<file path=ppt/slides/slide50.xml><?xml version="1.0" encoding="utf-8"?>
 <p:sld xmlns:a="http://schemas.openxmlformats.org/drawingml/2006/main" xmlns:r="http://schemas.openxmlformats.org/officeDocument/2006/relationships" xmlns:p="http://schemas.openxmlformats.org/presentationml/2006/main">
   <p:cSld>
     <p:spTree>
@@ -33099,120 +33295,7 @@
 </p:sld>
 </file>
 
-<file path=ppt/slides/slide5.xml><?xml version="1.0" encoding="utf-8"?>
-<p:sld xmlns:a="http://schemas.openxmlformats.org/drawingml/2006/main" xmlns:r="http://schemas.openxmlformats.org/officeDocument/2006/relationships" xmlns:p="http://schemas.openxmlformats.org/presentationml/2006/main">
-  <p:cSld>
-    <p:spTree>
-      <p:nvGrpSpPr>
-        <p:cNvPr id="1" name=""/>
-        <p:cNvGrpSpPr/>
-        <p:nvPr/>
-      </p:nvGrpSpPr>
-      <p:grpSpPr>
-        <a:xfrm>
-          <a:off x="0" y="0"/>
-          <a:ext cx="0" cy="0"/>
-          <a:chOff x="0" y="0"/>
-          <a:chExt cx="0" cy="0"/>
-        </a:xfrm>
-      </p:grpSpPr>
-      <p:sp>
-        <p:nvSpPr>
-          <p:cNvPr id="2" name="Title 1"/>
-          <p:cNvSpPr>
-            <a:spLocks noGrp="1"/>
-          </p:cNvSpPr>
-          <p:nvPr>
-            <p:ph type="title"/>
-          </p:nvPr>
-        </p:nvSpPr>
-        <p:spPr/>
-        <p:txBody>
-          <a:bodyPr/>
-          <a:lstStyle/>
-          <a:p>
-            <a:r>
-              <a:rPr lang="en-US" dirty="0" smtClean="0"/>
-              <a:t>Strategy 1: filtering out missing values</a:t>
-            </a:r>
-            <a:endParaRPr lang="en-US" dirty="0"/>
-          </a:p>
-        </p:txBody>
-      </p:sp>
-      <p:pic>
-        <p:nvPicPr>
-          <p:cNvPr id="3" name="Picture 2"/>
-          <p:cNvPicPr>
-            <a:picLocks noChangeAspect="1"/>
-          </p:cNvPicPr>
-          <p:nvPr/>
-        </p:nvPicPr>
-        <p:blipFill>
-          <a:blip r:embed="rId2">
-            <a:extLst>
-              <a:ext uri="{28A0092B-C50C-407E-A947-70E740481C1C}">
-                <a14:useLocalDpi xmlns:a14="http://schemas.microsoft.com/office/drawing/2010/main" val="0"/>
-              </a:ext>
-            </a:extLst>
-          </a:blip>
-          <a:stretch>
-            <a:fillRect/>
-          </a:stretch>
-        </p:blipFill>
-        <p:spPr>
-          <a:xfrm>
-            <a:off x="1993900" y="1690688"/>
-            <a:ext cx="8204200" cy="3048000"/>
-          </a:xfrm>
-          <a:prstGeom prst="rect">
-            <a:avLst/>
-          </a:prstGeom>
-        </p:spPr>
-      </p:pic>
-      <p:pic>
-        <p:nvPicPr>
-          <p:cNvPr id="6" name="Picture 5"/>
-          <p:cNvPicPr>
-            <a:picLocks noChangeAspect="1"/>
-          </p:cNvPicPr>
-          <p:nvPr/>
-        </p:nvPicPr>
-        <p:blipFill>
-          <a:blip r:embed="rId3">
-            <a:extLst>
-              <a:ext uri="{28A0092B-C50C-407E-A947-70E740481C1C}">
-                <a14:useLocalDpi xmlns:a14="http://schemas.microsoft.com/office/drawing/2010/main" val="0"/>
-              </a:ext>
-            </a:extLst>
-          </a:blip>
-          <a:stretch>
-            <a:fillRect/>
-          </a:stretch>
-        </p:blipFill>
-        <p:spPr>
-          <a:xfrm>
-            <a:off x="1993900" y="4984955"/>
-            <a:ext cx="8216900" cy="1358900"/>
-          </a:xfrm>
-          <a:prstGeom prst="rect">
-            <a:avLst/>
-          </a:prstGeom>
-        </p:spPr>
-      </p:pic>
-    </p:spTree>
-    <p:extLst>
-      <p:ext uri="{BB962C8B-B14F-4D97-AF65-F5344CB8AC3E}">
-        <p14:creationId xmlns:p14="http://schemas.microsoft.com/office/powerpoint/2010/main" val="341029413"/>
-      </p:ext>
-    </p:extLst>
-  </p:cSld>
-  <p:clrMapOvr>
-    <a:masterClrMapping/>
-  </p:clrMapOvr>
-</p:sld>
-</file>
-
-<file path=ppt/slides/slide50.xml><?xml version="1.0" encoding="utf-8"?>
+<file path=ppt/slides/slide51.xml><?xml version="1.0" encoding="utf-8"?>
 <p:sld xmlns:a="http://schemas.openxmlformats.org/drawingml/2006/main" xmlns:r="http://schemas.openxmlformats.org/officeDocument/2006/relationships" xmlns:p="http://schemas.openxmlformats.org/presentationml/2006/main">
   <p:cSld>
     <p:spTree>
@@ -41506,7 +41589,7 @@
 </p:sld>
 </file>
 
-<file path=ppt/slides/slide51.xml><?xml version="1.0" encoding="utf-8"?>
+<file path=ppt/slides/slide52.xml><?xml version="1.0" encoding="utf-8"?>
 <p:sld xmlns:a="http://schemas.openxmlformats.org/drawingml/2006/main" xmlns:r="http://schemas.openxmlformats.org/officeDocument/2006/relationships" xmlns:p="http://schemas.openxmlformats.org/presentationml/2006/main">
   <p:cSld>
     <p:spTree>
@@ -41766,7 +41849,7 @@
             <a:fld id="{B6F15528-21DE-4FAA-801E-634DDDAF4B2B}" type="slidenum">
               <a:rPr lang="en-US" smtClean="0"/>
               <a:pPr/>
-              <a:t>51</a:t>
+              <a:t>52</a:t>
             </a:fld>
             <a:endParaRPr lang="en-US" dirty="0"/>
           </a:p>
@@ -41833,7 +41916,7 @@
 </p:sld>
 </file>
 
-<file path=ppt/slides/slide52.xml><?xml version="1.0" encoding="utf-8"?>
+<file path=ppt/slides/slide53.xml><?xml version="1.0" encoding="utf-8"?>
 <p:sld xmlns:a="http://schemas.openxmlformats.org/drawingml/2006/main" xmlns:r="http://schemas.openxmlformats.org/officeDocument/2006/relationships" xmlns:p="http://schemas.openxmlformats.org/presentationml/2006/main">
   <p:cSld>
     <p:spTree>
@@ -42059,7 +42142,7 @@
             <a:fld id="{B6F15528-21DE-4FAA-801E-634DDDAF4B2B}" type="slidenum">
               <a:rPr lang="en-US" smtClean="0"/>
               <a:pPr/>
-              <a:t>52</a:t>
+              <a:t>53</a:t>
             </a:fld>
             <a:endParaRPr lang="en-US" dirty="0"/>
           </a:p>
@@ -42126,7 +42209,7 @@
 </p:sld>
 </file>
 
-<file path=ppt/slides/slide53.xml><?xml version="1.0" encoding="utf-8"?>
+<file path=ppt/slides/slide54.xml><?xml version="1.0" encoding="utf-8"?>
 <p:sld xmlns:a="http://schemas.openxmlformats.org/drawingml/2006/main" xmlns:r="http://schemas.openxmlformats.org/officeDocument/2006/relationships" xmlns:p="http://schemas.openxmlformats.org/presentationml/2006/main">
   <p:cSld>
     <p:spTree>
@@ -42868,7 +42951,7 @@
             <a:fld id="{B6F15528-21DE-4FAA-801E-634DDDAF4B2B}" type="slidenum">
               <a:rPr lang="en-US" smtClean="0"/>
               <a:pPr/>
-              <a:t>53</a:t>
+              <a:t>54</a:t>
             </a:fld>
             <a:endParaRPr lang="en-US" dirty="0"/>
           </a:p>
@@ -42894,7 +42977,7 @@
 </p:sld>
 </file>
 
-<file path=ppt/slides/slide54.xml><?xml version="1.0" encoding="utf-8"?>
+<file path=ppt/slides/slide55.xml><?xml version="1.0" encoding="utf-8"?>
 <p:sld xmlns:a="http://schemas.openxmlformats.org/drawingml/2006/main" xmlns:r="http://schemas.openxmlformats.org/officeDocument/2006/relationships" xmlns:p="http://schemas.openxmlformats.org/presentationml/2006/main">
   <p:cSld>
     <p:spTree>
@@ -42973,7 +43056,7 @@
             <a:fld id="{B6F15528-21DE-4FAA-801E-634DDDAF4B2B}" type="slidenum">
               <a:rPr lang="en-US" smtClean="0"/>
               <a:pPr/>
-              <a:t>54</a:t>
+              <a:t>55</a:t>
             </a:fld>
             <a:endParaRPr lang="en-US" dirty="0"/>
           </a:p>
@@ -43038,7 +43121,7 @@
 </p:sld>
 </file>
 
-<file path=ppt/slides/slide55.xml><?xml version="1.0" encoding="utf-8"?>
+<file path=ppt/slides/slide56.xml><?xml version="1.0" encoding="utf-8"?>
 <p:sld xmlns:a="http://schemas.openxmlformats.org/drawingml/2006/main" xmlns:r="http://schemas.openxmlformats.org/officeDocument/2006/relationships" xmlns:p="http://schemas.openxmlformats.org/presentationml/2006/main">
   <p:cSld>
     <p:spTree>
@@ -43121,7 +43204,7 @@
             <a:fld id="{B6F15528-21DE-4FAA-801E-634DDDAF4B2B}" type="slidenum">
               <a:rPr lang="en-US" smtClean="0"/>
               <a:pPr/>
-              <a:t>55</a:t>
+              <a:t>56</a:t>
             </a:fld>
             <a:endParaRPr lang="en-US" dirty="0"/>
           </a:p>
@@ -44508,7 +44591,7 @@
 </p:sld>
 </file>
 
-<file path=ppt/slides/slide56.xml><?xml version="1.0" encoding="utf-8"?>
+<file path=ppt/slides/slide57.xml><?xml version="1.0" encoding="utf-8"?>
 <p:sld xmlns:a="http://schemas.openxmlformats.org/drawingml/2006/main" xmlns:r="http://schemas.openxmlformats.org/officeDocument/2006/relationships" xmlns:p="http://schemas.openxmlformats.org/presentationml/2006/main">
   <p:cSld>
     <p:spTree>
@@ -44598,7 +44681,7 @@
             <a:fld id="{B6F15528-21DE-4FAA-801E-634DDDAF4B2B}" type="slidenum">
               <a:rPr lang="en-US" smtClean="0"/>
               <a:pPr/>
-              <a:t>56</a:t>
+              <a:t>57</a:t>
             </a:fld>
             <a:endParaRPr lang="en-US" dirty="0"/>
           </a:p>
@@ -45793,7 +45876,7 @@
 </p:sld>
 </file>
 
-<file path=ppt/slides/slide57.xml><?xml version="1.0" encoding="utf-8"?>
+<file path=ppt/slides/slide58.xml><?xml version="1.0" encoding="utf-8"?>
 <p:sld xmlns:a="http://schemas.openxmlformats.org/drawingml/2006/main" xmlns:r="http://schemas.openxmlformats.org/officeDocument/2006/relationships" xmlns:p="http://schemas.openxmlformats.org/presentationml/2006/main">
   <p:cSld>
     <p:spTree>
@@ -45873,7 +45956,7 @@
             <a:fld id="{B6F15528-21DE-4FAA-801E-634DDDAF4B2B}" type="slidenum">
               <a:rPr lang="en-US" smtClean="0"/>
               <a:pPr/>
-              <a:t>57</a:t>
+              <a:t>58</a:t>
             </a:fld>
             <a:endParaRPr lang="en-US" dirty="0"/>
           </a:p>
@@ -46298,7 +46381,7 @@
 </p:sld>
 </file>
 
-<file path=ppt/slides/slide58.xml><?xml version="1.0" encoding="utf-8"?>
+<file path=ppt/slides/slide59.xml><?xml version="1.0" encoding="utf-8"?>
 <p:sld xmlns:a="http://schemas.openxmlformats.org/drawingml/2006/main" xmlns:r="http://schemas.openxmlformats.org/officeDocument/2006/relationships" xmlns:p="http://schemas.openxmlformats.org/presentationml/2006/main">
   <p:cSld>
     <p:spTree>
@@ -46377,7 +46460,7 @@
             <a:fld id="{B6F15528-21DE-4FAA-801E-634DDDAF4B2B}" type="slidenum">
               <a:rPr lang="en-US" smtClean="0"/>
               <a:pPr/>
-              <a:t>58</a:t>
+              <a:t>59</a:t>
             </a:fld>
             <a:endParaRPr lang="en-US" dirty="0"/>
           </a:p>
@@ -46467,7 +46550,120 @@
 </p:sld>
 </file>
 
-<file path=ppt/slides/slide59.xml><?xml version="1.0" encoding="utf-8"?>
+<file path=ppt/slides/slide6.xml><?xml version="1.0" encoding="utf-8"?>
+<p:sld xmlns:a="http://schemas.openxmlformats.org/drawingml/2006/main" xmlns:r="http://schemas.openxmlformats.org/officeDocument/2006/relationships" xmlns:p="http://schemas.openxmlformats.org/presentationml/2006/main">
+  <p:cSld>
+    <p:spTree>
+      <p:nvGrpSpPr>
+        <p:cNvPr id="1" name=""/>
+        <p:cNvGrpSpPr/>
+        <p:nvPr/>
+      </p:nvGrpSpPr>
+      <p:grpSpPr>
+        <a:xfrm>
+          <a:off x="0" y="0"/>
+          <a:ext cx="0" cy="0"/>
+          <a:chOff x="0" y="0"/>
+          <a:chExt cx="0" cy="0"/>
+        </a:xfrm>
+      </p:grpSpPr>
+      <p:sp>
+        <p:nvSpPr>
+          <p:cNvPr id="2" name="Title 1"/>
+          <p:cNvSpPr>
+            <a:spLocks noGrp="1"/>
+          </p:cNvSpPr>
+          <p:nvPr>
+            <p:ph type="title"/>
+          </p:nvPr>
+        </p:nvSpPr>
+        <p:spPr/>
+        <p:txBody>
+          <a:bodyPr/>
+          <a:lstStyle/>
+          <a:p>
+            <a:r>
+              <a:rPr lang="en-US" dirty="0" smtClean="0"/>
+              <a:t>Strategy 1: filtering out missing values</a:t>
+            </a:r>
+            <a:endParaRPr lang="en-US" dirty="0"/>
+          </a:p>
+        </p:txBody>
+      </p:sp>
+      <p:pic>
+        <p:nvPicPr>
+          <p:cNvPr id="3" name="Picture 2"/>
+          <p:cNvPicPr>
+            <a:picLocks noChangeAspect="1"/>
+          </p:cNvPicPr>
+          <p:nvPr/>
+        </p:nvPicPr>
+        <p:blipFill>
+          <a:blip r:embed="rId2">
+            <a:extLst>
+              <a:ext uri="{28A0092B-C50C-407E-A947-70E740481C1C}">
+                <a14:useLocalDpi xmlns:a14="http://schemas.microsoft.com/office/drawing/2010/main" val="0"/>
+              </a:ext>
+            </a:extLst>
+          </a:blip>
+          <a:stretch>
+            <a:fillRect/>
+          </a:stretch>
+        </p:blipFill>
+        <p:spPr>
+          <a:xfrm>
+            <a:off x="1993900" y="1690688"/>
+            <a:ext cx="8204200" cy="3048000"/>
+          </a:xfrm>
+          <a:prstGeom prst="rect">
+            <a:avLst/>
+          </a:prstGeom>
+        </p:spPr>
+      </p:pic>
+      <p:pic>
+        <p:nvPicPr>
+          <p:cNvPr id="6" name="Picture 5"/>
+          <p:cNvPicPr>
+            <a:picLocks noChangeAspect="1"/>
+          </p:cNvPicPr>
+          <p:nvPr/>
+        </p:nvPicPr>
+        <p:blipFill>
+          <a:blip r:embed="rId3">
+            <a:extLst>
+              <a:ext uri="{28A0092B-C50C-407E-A947-70E740481C1C}">
+                <a14:useLocalDpi xmlns:a14="http://schemas.microsoft.com/office/drawing/2010/main" val="0"/>
+              </a:ext>
+            </a:extLst>
+          </a:blip>
+          <a:stretch>
+            <a:fillRect/>
+          </a:stretch>
+        </p:blipFill>
+        <p:spPr>
+          <a:xfrm>
+            <a:off x="1993900" y="4984955"/>
+            <a:ext cx="8216900" cy="1358900"/>
+          </a:xfrm>
+          <a:prstGeom prst="rect">
+            <a:avLst/>
+          </a:prstGeom>
+        </p:spPr>
+      </p:pic>
+    </p:spTree>
+    <p:extLst>
+      <p:ext uri="{BB962C8B-B14F-4D97-AF65-F5344CB8AC3E}">
+        <p14:creationId xmlns:p14="http://schemas.microsoft.com/office/powerpoint/2010/main" val="341029413"/>
+      </p:ext>
+    </p:extLst>
+  </p:cSld>
+  <p:clrMapOvr>
+    <a:masterClrMapping/>
+  </p:clrMapOvr>
+</p:sld>
+</file>
+
+<file path=ppt/slides/slide60.xml><?xml version="1.0" encoding="utf-8"?>
 <p:sld xmlns:a="http://schemas.openxmlformats.org/drawingml/2006/main" xmlns:r="http://schemas.openxmlformats.org/officeDocument/2006/relationships" xmlns:p="http://schemas.openxmlformats.org/presentationml/2006/main">
   <p:cSld>
     <p:spTree>
@@ -46557,7 +46753,7 @@
             <a:fld id="{B6F15528-21DE-4FAA-801E-634DDDAF4B2B}" type="slidenum">
               <a:rPr lang="en-US" smtClean="0"/>
               <a:pPr/>
-              <a:t>59</a:t>
+              <a:t>60</a:t>
             </a:fld>
             <a:endParaRPr lang="en-US" dirty="0"/>
           </a:p>
@@ -46647,120 +46843,7 @@
 </p:sld>
 </file>
 
-<file path=ppt/slides/slide6.xml><?xml version="1.0" encoding="utf-8"?>
-<p:sld xmlns:a="http://schemas.openxmlformats.org/drawingml/2006/main" xmlns:r="http://schemas.openxmlformats.org/officeDocument/2006/relationships" xmlns:p="http://schemas.openxmlformats.org/presentationml/2006/main">
-  <p:cSld>
-    <p:spTree>
-      <p:nvGrpSpPr>
-        <p:cNvPr id="1" name=""/>
-        <p:cNvGrpSpPr/>
-        <p:nvPr/>
-      </p:nvGrpSpPr>
-      <p:grpSpPr>
-        <a:xfrm>
-          <a:off x="0" y="0"/>
-          <a:ext cx="0" cy="0"/>
-          <a:chOff x="0" y="0"/>
-          <a:chExt cx="0" cy="0"/>
-        </a:xfrm>
-      </p:grpSpPr>
-      <p:sp>
-        <p:nvSpPr>
-          <p:cNvPr id="2" name="Title 1"/>
-          <p:cNvSpPr>
-            <a:spLocks noGrp="1"/>
-          </p:cNvSpPr>
-          <p:nvPr>
-            <p:ph type="title"/>
-          </p:nvPr>
-        </p:nvSpPr>
-        <p:spPr/>
-        <p:txBody>
-          <a:bodyPr/>
-          <a:lstStyle/>
-          <a:p>
-            <a:r>
-              <a:rPr lang="en-US" dirty="0" smtClean="0"/>
-              <a:t>Strategy 2: filtering out some missing values</a:t>
-            </a:r>
-            <a:endParaRPr lang="en-US" dirty="0"/>
-          </a:p>
-        </p:txBody>
-      </p:sp>
-      <p:pic>
-        <p:nvPicPr>
-          <p:cNvPr id="4" name="Picture 3"/>
-          <p:cNvPicPr>
-            <a:picLocks noChangeAspect="1"/>
-          </p:cNvPicPr>
-          <p:nvPr/>
-        </p:nvPicPr>
-        <p:blipFill>
-          <a:blip r:embed="rId2">
-            <a:extLst>
-              <a:ext uri="{28A0092B-C50C-407E-A947-70E740481C1C}">
-                <a14:useLocalDpi xmlns:a14="http://schemas.microsoft.com/office/drawing/2010/main" val="0"/>
-              </a:ext>
-            </a:extLst>
-          </a:blip>
-          <a:stretch>
-            <a:fillRect/>
-          </a:stretch>
-        </p:blipFill>
-        <p:spPr>
-          <a:xfrm>
-            <a:off x="1993900" y="4738688"/>
-            <a:ext cx="8267700" cy="2184400"/>
-          </a:xfrm>
-          <a:prstGeom prst="rect">
-            <a:avLst/>
-          </a:prstGeom>
-        </p:spPr>
-      </p:pic>
-      <p:pic>
-        <p:nvPicPr>
-          <p:cNvPr id="6" name="Picture 5"/>
-          <p:cNvPicPr>
-            <a:picLocks noChangeAspect="1"/>
-          </p:cNvPicPr>
-          <p:nvPr/>
-        </p:nvPicPr>
-        <p:blipFill>
-          <a:blip r:embed="rId3">
-            <a:extLst>
-              <a:ext uri="{28A0092B-C50C-407E-A947-70E740481C1C}">
-                <a14:useLocalDpi xmlns:a14="http://schemas.microsoft.com/office/drawing/2010/main" val="0"/>
-              </a:ext>
-            </a:extLst>
-          </a:blip>
-          <a:stretch>
-            <a:fillRect/>
-          </a:stretch>
-        </p:blipFill>
-        <p:spPr>
-          <a:xfrm>
-            <a:off x="1993900" y="1690688"/>
-            <a:ext cx="8204200" cy="3048000"/>
-          </a:xfrm>
-          <a:prstGeom prst="rect">
-            <a:avLst/>
-          </a:prstGeom>
-        </p:spPr>
-      </p:pic>
-    </p:spTree>
-    <p:extLst>
-      <p:ext uri="{BB962C8B-B14F-4D97-AF65-F5344CB8AC3E}">
-        <p14:creationId xmlns:p14="http://schemas.microsoft.com/office/powerpoint/2010/main" val="47490448"/>
-      </p:ext>
-    </p:extLst>
-  </p:cSld>
-  <p:clrMapOvr>
-    <a:masterClrMapping/>
-  </p:clrMapOvr>
-</p:sld>
-</file>
-
-<file path=ppt/slides/slide60.xml><?xml version="1.0" encoding="utf-8"?>
+<file path=ppt/slides/slide61.xml><?xml version="1.0" encoding="utf-8"?>
 <p:sld xmlns:a="http://schemas.openxmlformats.org/drawingml/2006/main" xmlns:r="http://schemas.openxmlformats.org/officeDocument/2006/relationships" xmlns:p="http://schemas.openxmlformats.org/presentationml/2006/main">
   <p:cSld>
     <p:spTree>
@@ -47053,7 +47136,7 @@
             <a:fld id="{B6F15528-21DE-4FAA-801E-634DDDAF4B2B}" type="slidenum">
               <a:rPr lang="en-US" smtClean="0"/>
               <a:pPr/>
-              <a:t>60</a:t>
+              <a:t>61</a:t>
             </a:fld>
             <a:endParaRPr lang="en-US" dirty="0"/>
           </a:p>
@@ -47143,7 +47226,7 @@
 </p:sld>
 </file>
 
-<file path=ppt/slides/slide61.xml><?xml version="1.0" encoding="utf-8"?>
+<file path=ppt/slides/slide62.xml><?xml version="1.0" encoding="utf-8"?>
 <p:sld xmlns:a="http://schemas.openxmlformats.org/drawingml/2006/main" xmlns:r="http://schemas.openxmlformats.org/officeDocument/2006/relationships" xmlns:p="http://schemas.openxmlformats.org/presentationml/2006/main">
   <p:cSld>
     <p:spTree>
@@ -47341,7 +47424,7 @@
 </p:sld>
 </file>
 
-<file path=ppt/slides/slide62.xml><?xml version="1.0" encoding="utf-8"?>
+<file path=ppt/slides/slide63.xml><?xml version="1.0" encoding="utf-8"?>
 <p:sld xmlns:a="http://schemas.openxmlformats.org/drawingml/2006/main" xmlns:r="http://schemas.openxmlformats.org/officeDocument/2006/relationships" xmlns:p="http://schemas.openxmlformats.org/presentationml/2006/main">
   <p:cSld>
     <p:spTree>
@@ -47462,7 +47545,7 @@
             <a:fld id="{6DF4C409-C017-451C-B236-E185BBA6E0E4}" type="slidenum">
               <a:rPr lang="tr-TR" smtClean="0"/>
               <a:pPr/>
-              <a:t>62</a:t>
+              <a:t>63</a:t>
             </a:fld>
             <a:endParaRPr lang="tr-TR" dirty="0"/>
           </a:p>
@@ -47488,7 +47571,7 @@
 </p:sld>
 </file>
 
-<file path=ppt/slides/slide63.xml><?xml version="1.0" encoding="utf-8"?>
+<file path=ppt/slides/slide64.xml><?xml version="1.0" encoding="utf-8"?>
 <p:sld xmlns:a="http://schemas.openxmlformats.org/drawingml/2006/main" xmlns:r="http://schemas.openxmlformats.org/officeDocument/2006/relationships" xmlns:p="http://schemas.openxmlformats.org/presentationml/2006/main">
   <p:cSld>
     <p:spTree>
@@ -47548,7 +47631,7 @@
 </p:sld>
 </file>
 
-<file path=ppt/slides/slide64.xml><?xml version="1.0" encoding="utf-8"?>
+<file path=ppt/slides/slide65.xml><?xml version="1.0" encoding="utf-8"?>
 <p:sld xmlns:a="http://schemas.openxmlformats.org/drawingml/2006/main" xmlns:r="http://schemas.openxmlformats.org/officeDocument/2006/relationships" xmlns:p="http://schemas.openxmlformats.org/presentationml/2006/main">
   <p:cSld>
     <p:spTree>
@@ -47721,7 +47804,7 @@
             <a:fld id="{6DF4C409-C017-451C-B236-E185BBA6E0E4}" type="slidenum">
               <a:rPr lang="tr-TR" smtClean="0"/>
               <a:pPr/>
-              <a:t>64</a:t>
+              <a:t>65</a:t>
             </a:fld>
             <a:endParaRPr lang="tr-TR" dirty="0"/>
           </a:p>
@@ -47747,7 +47830,7 @@
 </p:sld>
 </file>
 
-<file path=ppt/slides/slide65.xml><?xml version="1.0" encoding="utf-8"?>
+<file path=ppt/slides/slide66.xml><?xml version="1.0" encoding="utf-8"?>
 <p:sld xmlns:a="http://schemas.openxmlformats.org/drawingml/2006/main" xmlns:r="http://schemas.openxmlformats.org/officeDocument/2006/relationships" xmlns:p="http://schemas.openxmlformats.org/presentationml/2006/main">
   <p:cSld>
     <p:spTree>
@@ -48101,7 +48184,7 @@
             <a:fld id="{6DF4C409-C017-451C-B236-E185BBA6E0E4}" type="slidenum">
               <a:rPr lang="tr-TR" smtClean="0"/>
               <a:pPr/>
-              <a:t>65</a:t>
+              <a:t>66</a:t>
             </a:fld>
             <a:endParaRPr lang="tr-TR" dirty="0"/>
           </a:p>
@@ -48127,7 +48210,7 @@
 </p:sld>
 </file>
 
-<file path=ppt/slides/slide66.xml><?xml version="1.0" encoding="utf-8"?>
+<file path=ppt/slides/slide67.xml><?xml version="1.0" encoding="utf-8"?>
 <p:sld xmlns:a="http://schemas.openxmlformats.org/drawingml/2006/main" xmlns:r="http://schemas.openxmlformats.org/officeDocument/2006/relationships" xmlns:p="http://schemas.openxmlformats.org/presentationml/2006/main">
   <p:cSld>
     <p:spTree>
@@ -48332,7 +48415,7 @@
             <a:fld id="{6DF4C409-C017-451C-B236-E185BBA6E0E4}" type="slidenum">
               <a:rPr lang="tr-TR" smtClean="0"/>
               <a:pPr/>
-              <a:t>66</a:t>
+              <a:t>67</a:t>
             </a:fld>
             <a:endParaRPr lang="tr-TR" dirty="0"/>
           </a:p>
@@ -48358,7 +48441,7 @@
 </p:sld>
 </file>
 
-<file path=ppt/slides/slide67.xml><?xml version="1.0" encoding="utf-8"?>
+<file path=ppt/slides/slide68.xml><?xml version="1.0" encoding="utf-8"?>
 <p:sld xmlns:a="http://schemas.openxmlformats.org/drawingml/2006/main" xmlns:r="http://schemas.openxmlformats.org/officeDocument/2006/relationships" xmlns:p="http://schemas.openxmlformats.org/presentationml/2006/main">
   <p:cSld>
     <p:spTree>
@@ -48709,7 +48792,7 @@
             <a:fld id="{6DF4C409-C017-451C-B236-E185BBA6E0E4}" type="slidenum">
               <a:rPr lang="tr-TR" smtClean="0"/>
               <a:pPr/>
-              <a:t>67</a:t>
+              <a:t>68</a:t>
             </a:fld>
             <a:endParaRPr lang="tr-TR" dirty="0"/>
           </a:p>
@@ -48736,6 +48819,119 @@
 </file>
 
 <file path=ppt/slides/slide7.xml><?xml version="1.0" encoding="utf-8"?>
+<p:sld xmlns:a="http://schemas.openxmlformats.org/drawingml/2006/main" xmlns:r="http://schemas.openxmlformats.org/officeDocument/2006/relationships" xmlns:p="http://schemas.openxmlformats.org/presentationml/2006/main">
+  <p:cSld>
+    <p:spTree>
+      <p:nvGrpSpPr>
+        <p:cNvPr id="1" name=""/>
+        <p:cNvGrpSpPr/>
+        <p:nvPr/>
+      </p:nvGrpSpPr>
+      <p:grpSpPr>
+        <a:xfrm>
+          <a:off x="0" y="0"/>
+          <a:ext cx="0" cy="0"/>
+          <a:chOff x="0" y="0"/>
+          <a:chExt cx="0" cy="0"/>
+        </a:xfrm>
+      </p:grpSpPr>
+      <p:sp>
+        <p:nvSpPr>
+          <p:cNvPr id="2" name="Title 1"/>
+          <p:cNvSpPr>
+            <a:spLocks noGrp="1"/>
+          </p:cNvSpPr>
+          <p:nvPr>
+            <p:ph type="title"/>
+          </p:nvPr>
+        </p:nvSpPr>
+        <p:spPr/>
+        <p:txBody>
+          <a:bodyPr/>
+          <a:lstStyle/>
+          <a:p>
+            <a:r>
+              <a:rPr lang="en-US" dirty="0" smtClean="0"/>
+              <a:t>Strategy 2: filtering out some missing values</a:t>
+            </a:r>
+            <a:endParaRPr lang="en-US" dirty="0"/>
+          </a:p>
+        </p:txBody>
+      </p:sp>
+      <p:pic>
+        <p:nvPicPr>
+          <p:cNvPr id="4" name="Picture 3"/>
+          <p:cNvPicPr>
+            <a:picLocks noChangeAspect="1"/>
+          </p:cNvPicPr>
+          <p:nvPr/>
+        </p:nvPicPr>
+        <p:blipFill>
+          <a:blip r:embed="rId2">
+            <a:extLst>
+              <a:ext uri="{28A0092B-C50C-407E-A947-70E740481C1C}">
+                <a14:useLocalDpi xmlns:a14="http://schemas.microsoft.com/office/drawing/2010/main" val="0"/>
+              </a:ext>
+            </a:extLst>
+          </a:blip>
+          <a:stretch>
+            <a:fillRect/>
+          </a:stretch>
+        </p:blipFill>
+        <p:spPr>
+          <a:xfrm>
+            <a:off x="1993900" y="4738688"/>
+            <a:ext cx="8267700" cy="2184400"/>
+          </a:xfrm>
+          <a:prstGeom prst="rect">
+            <a:avLst/>
+          </a:prstGeom>
+        </p:spPr>
+      </p:pic>
+      <p:pic>
+        <p:nvPicPr>
+          <p:cNvPr id="6" name="Picture 5"/>
+          <p:cNvPicPr>
+            <a:picLocks noChangeAspect="1"/>
+          </p:cNvPicPr>
+          <p:nvPr/>
+        </p:nvPicPr>
+        <p:blipFill>
+          <a:blip r:embed="rId3">
+            <a:extLst>
+              <a:ext uri="{28A0092B-C50C-407E-A947-70E740481C1C}">
+                <a14:useLocalDpi xmlns:a14="http://schemas.microsoft.com/office/drawing/2010/main" val="0"/>
+              </a:ext>
+            </a:extLst>
+          </a:blip>
+          <a:stretch>
+            <a:fillRect/>
+          </a:stretch>
+        </p:blipFill>
+        <p:spPr>
+          <a:xfrm>
+            <a:off x="1993900" y="1690688"/>
+            <a:ext cx="8204200" cy="3048000"/>
+          </a:xfrm>
+          <a:prstGeom prst="rect">
+            <a:avLst/>
+          </a:prstGeom>
+        </p:spPr>
+      </p:pic>
+    </p:spTree>
+    <p:extLst>
+      <p:ext uri="{BB962C8B-B14F-4D97-AF65-F5344CB8AC3E}">
+        <p14:creationId xmlns:p14="http://schemas.microsoft.com/office/powerpoint/2010/main" val="47490448"/>
+      </p:ext>
+    </p:extLst>
+  </p:cSld>
+  <p:clrMapOvr>
+    <a:masterClrMapping/>
+  </p:clrMapOvr>
+</p:sld>
+</file>
+
+<file path=ppt/slides/slide8.xml><?xml version="1.0" encoding="utf-8"?>
 <p:sld xmlns:a="http://schemas.openxmlformats.org/drawingml/2006/main" xmlns:r="http://schemas.openxmlformats.org/officeDocument/2006/relationships" xmlns:p="http://schemas.openxmlformats.org/presentationml/2006/main">
   <p:cSld>
     <p:spTree>
@@ -48848,7 +49044,7 @@
 </p:sld>
 </file>
 
-<file path=ppt/slides/slide8.xml><?xml version="1.0" encoding="utf-8"?>
+<file path=ppt/slides/slide9.xml><?xml version="1.0" encoding="utf-8"?>
 <p:sld xmlns:a="http://schemas.openxmlformats.org/drawingml/2006/main" xmlns:r="http://schemas.openxmlformats.org/officeDocument/2006/relationships" xmlns:p="http://schemas.openxmlformats.org/presentationml/2006/main">
   <p:cSld>
     <p:spTree>
@@ -48922,89 +49118,6 @@
     <p:extLst>
       <p:ext uri="{BB962C8B-B14F-4D97-AF65-F5344CB8AC3E}">
         <p14:creationId xmlns:p14="http://schemas.microsoft.com/office/powerpoint/2010/main" val="1047645716"/>
-      </p:ext>
-    </p:extLst>
-  </p:cSld>
-  <p:clrMapOvr>
-    <a:masterClrMapping/>
-  </p:clrMapOvr>
-</p:sld>
-</file>
-
-<file path=ppt/slides/slide9.xml><?xml version="1.0" encoding="utf-8"?>
-<p:sld xmlns:a="http://schemas.openxmlformats.org/drawingml/2006/main" xmlns:r="http://schemas.openxmlformats.org/officeDocument/2006/relationships" xmlns:p="http://schemas.openxmlformats.org/presentationml/2006/main">
-  <p:cSld>
-    <p:spTree>
-      <p:nvGrpSpPr>
-        <p:cNvPr id="1" name=""/>
-        <p:cNvGrpSpPr/>
-        <p:nvPr/>
-      </p:nvGrpSpPr>
-      <p:grpSpPr>
-        <a:xfrm>
-          <a:off x="0" y="0"/>
-          <a:ext cx="0" cy="0"/>
-          <a:chOff x="0" y="0"/>
-          <a:chExt cx="0" cy="0"/>
-        </a:xfrm>
-      </p:grpSpPr>
-      <p:sp>
-        <p:nvSpPr>
-          <p:cNvPr id="2" name="Title 1"/>
-          <p:cNvSpPr>
-            <a:spLocks noGrp="1"/>
-          </p:cNvSpPr>
-          <p:nvPr>
-            <p:ph type="title"/>
-          </p:nvPr>
-        </p:nvSpPr>
-        <p:spPr/>
-        <p:txBody>
-          <a:bodyPr/>
-          <a:lstStyle/>
-          <a:p>
-            <a:r>
-              <a:rPr lang="en-US" dirty="0" smtClean="0"/>
-              <a:t>Strategy 3.2: filling in missing values</a:t>
-            </a:r>
-            <a:endParaRPr lang="en-US" dirty="0"/>
-          </a:p>
-        </p:txBody>
-      </p:sp>
-      <p:pic>
-        <p:nvPicPr>
-          <p:cNvPr id="3" name="Picture 2"/>
-          <p:cNvPicPr>
-            <a:picLocks noChangeAspect="1"/>
-          </p:cNvPicPr>
-          <p:nvPr/>
-        </p:nvPicPr>
-        <p:blipFill>
-          <a:blip r:embed="rId2">
-            <a:extLst>
-              <a:ext uri="{28A0092B-C50C-407E-A947-70E740481C1C}">
-                <a14:useLocalDpi xmlns:a14="http://schemas.microsoft.com/office/drawing/2010/main" val="0"/>
-              </a:ext>
-            </a:extLst>
-          </a:blip>
-          <a:stretch>
-            <a:fillRect/>
-          </a:stretch>
-        </p:blipFill>
-        <p:spPr>
-          <a:xfrm>
-            <a:off x="1981200" y="2000455"/>
-            <a:ext cx="8229600" cy="3683000"/>
-          </a:xfrm>
-          <a:prstGeom prst="rect">
-            <a:avLst/>
-          </a:prstGeom>
-        </p:spPr>
-      </p:pic>
-    </p:spTree>
-    <p:extLst>
-      <p:ext uri="{BB962C8B-B14F-4D97-AF65-F5344CB8AC3E}">
-        <p14:creationId xmlns:p14="http://schemas.microsoft.com/office/powerpoint/2010/main" val="563127059"/>
       </p:ext>
     </p:extLst>
   </p:cSld>

</xml_diff>